<commit_message>
Added deliverables to KOM.pptx
</commit_message>
<xml_diff>
--- a/Docs/Project documentation/KOM.pptx
+++ b/Docs/Project documentation/KOM.pptx
@@ -5,36 +5,38 @@
     <p:sldMasterId id="2147483648" r:id="rId2"/>
   </p:sldMasterIdLst>
   <p:notesMasterIdLst>
-    <p:notesMasterId r:id="rId22"/>
+    <p:notesMasterId r:id="rId24"/>
   </p:notesMasterIdLst>
   <p:handoutMasterIdLst>
-    <p:handoutMasterId r:id="rId23"/>
+    <p:handoutMasterId r:id="rId25"/>
   </p:handoutMasterIdLst>
   <p:sldIdLst>
     <p:sldId id="265" r:id="rId3"/>
     <p:sldId id="310" r:id="rId4"/>
-    <p:sldId id="320" r:id="rId5"/>
-    <p:sldId id="335" r:id="rId6"/>
-    <p:sldId id="327" r:id="rId7"/>
-    <p:sldId id="330" r:id="rId8"/>
-    <p:sldId id="331" r:id="rId9"/>
-    <p:sldId id="332" r:id="rId10"/>
-    <p:sldId id="333" r:id="rId11"/>
-    <p:sldId id="336" r:id="rId12"/>
-    <p:sldId id="322" r:id="rId13"/>
-    <p:sldId id="325" r:id="rId14"/>
-    <p:sldId id="311" r:id="rId15"/>
-    <p:sldId id="328" r:id="rId16"/>
-    <p:sldId id="329" r:id="rId17"/>
-    <p:sldId id="337" r:id="rId18"/>
-    <p:sldId id="323" r:id="rId19"/>
-    <p:sldId id="324" r:id="rId20"/>
-    <p:sldId id="314" r:id="rId21"/>
+    <p:sldId id="339" r:id="rId5"/>
+    <p:sldId id="320" r:id="rId6"/>
+    <p:sldId id="335" r:id="rId7"/>
+    <p:sldId id="327" r:id="rId8"/>
+    <p:sldId id="330" r:id="rId9"/>
+    <p:sldId id="331" r:id="rId10"/>
+    <p:sldId id="332" r:id="rId11"/>
+    <p:sldId id="333" r:id="rId12"/>
+    <p:sldId id="336" r:id="rId13"/>
+    <p:sldId id="322" r:id="rId14"/>
+    <p:sldId id="325" r:id="rId15"/>
+    <p:sldId id="311" r:id="rId16"/>
+    <p:sldId id="328" r:id="rId17"/>
+    <p:sldId id="329" r:id="rId18"/>
+    <p:sldId id="338" r:id="rId19"/>
+    <p:sldId id="337" r:id="rId20"/>
+    <p:sldId id="323" r:id="rId21"/>
+    <p:sldId id="324" r:id="rId22"/>
+    <p:sldId id="314" r:id="rId23"/>
   </p:sldIdLst>
   <p:sldSz cx="12188825" cy="6858000"/>
   <p:notesSz cx="6858000" cy="9144000"/>
   <p:custDataLst>
-    <p:tags r:id="rId24"/>
+    <p:tags r:id="rId26"/>
   </p:custDataLst>
   <p:defaultTextStyle>
     <a:defPPr>
@@ -5882,6 +5884,173 @@
       </p:grpSpPr>
       <p:sp>
         <p:nvSpPr>
+          <p:cNvPr id="13" name="Título 12"/>
+          <p:cNvSpPr>
+            <a:spLocks noGrp="1"/>
+          </p:cNvSpPr>
+          <p:nvPr>
+            <p:ph type="title"/>
+          </p:nvPr>
+        </p:nvSpPr>
+        <p:spPr/>
+        <p:txBody>
+          <a:bodyPr/>
+          <a:lstStyle/>
+          <a:p>
+            <a:r>
+              <a:rPr lang="pt-PT" dirty="0" smtClean="0"/>
+              <a:t>Software</a:t>
+            </a:r>
+            <a:endParaRPr lang="pt-PT" dirty="0"/>
+          </a:p>
+        </p:txBody>
+      </p:sp>
+      <p:sp>
+        <p:nvSpPr>
+          <p:cNvPr id="14" name="Marcador de Posição de Conteúdo 13"/>
+          <p:cNvSpPr>
+            <a:spLocks noGrp="1"/>
+          </p:cNvSpPr>
+          <p:nvPr>
+            <p:ph idx="1"/>
+          </p:nvPr>
+        </p:nvSpPr>
+        <p:spPr/>
+        <p:txBody>
+          <a:bodyPr>
+            <a:normAutofit/>
+          </a:bodyPr>
+          <a:lstStyle/>
+          <a:p>
+            <a:r>
+              <a:rPr lang="en-GB" b="1" dirty="0" smtClean="0"/>
+              <a:t>Assumptions</a:t>
+            </a:r>
+            <a:r>
+              <a:rPr lang="en-GB" b="1" dirty="0"/>
+              <a:t>:</a:t>
+            </a:r>
+          </a:p>
+          <a:p>
+            <a:pPr lvl="1"/>
+            <a:endParaRPr lang="en-GB" b="1" dirty="0"/>
+          </a:p>
+          <a:p>
+            <a:pPr lvl="1"/>
+            <a:r>
+              <a:rPr lang="en-GB" dirty="0"/>
+              <a:t>The computer will have:</a:t>
+            </a:r>
+          </a:p>
+          <a:p>
+            <a:pPr lvl="2"/>
+            <a:r>
+              <a:rPr lang="en-GB" dirty="0"/>
+              <a:t>Windows OS (least the Vista version);</a:t>
+            </a:r>
+          </a:p>
+          <a:p>
+            <a:pPr lvl="2"/>
+            <a:r>
+              <a:rPr lang="en-GB" dirty="0"/>
+              <a:t>Framework .NET 4.5;</a:t>
+            </a:r>
+          </a:p>
+          <a:p>
+            <a:pPr lvl="2"/>
+            <a:endParaRPr lang="en-GB" dirty="0"/>
+          </a:p>
+          <a:p>
+            <a:pPr lvl="1"/>
+            <a:r>
+              <a:rPr lang="en-GB" dirty="0"/>
+              <a:t>The Smartphone will have:</a:t>
+            </a:r>
+          </a:p>
+          <a:p>
+            <a:pPr lvl="2"/>
+            <a:r>
+              <a:rPr lang="en-GB" dirty="0"/>
+              <a:t>An Android platform;</a:t>
+            </a:r>
+          </a:p>
+          <a:p>
+            <a:pPr lvl="2"/>
+            <a:r>
+              <a:rPr lang="en-GB" dirty="0"/>
+              <a:t>Wireless technology.</a:t>
+            </a:r>
+          </a:p>
+          <a:p>
+            <a:pPr lvl="2"/>
+            <a:endParaRPr lang="en-GB" dirty="0"/>
+          </a:p>
+          <a:p>
+            <a:pPr lvl="1"/>
+            <a:r>
+              <a:rPr lang="en-GB" dirty="0"/>
+              <a:t>The computer and the smartphone must be connected to the same network</a:t>
+            </a:r>
+          </a:p>
+          <a:p>
+            <a:pPr marL="0" indent="0">
+              <a:buNone/>
+            </a:pPr>
+            <a:endParaRPr lang="pt-PT" dirty="0" smtClean="0"/>
+          </a:p>
+        </p:txBody>
+      </p:sp>
+    </p:spTree>
+    <p:extLst>
+      <p:ext uri="{BB962C8B-B14F-4D97-AF65-F5344CB8AC3E}">
+        <p14:creationId xmlns:p14="http://schemas.microsoft.com/office/powerpoint/2010/main" val="4051420759"/>
+      </p:ext>
+    </p:extLst>
+  </p:cSld>
+  <p:clrMapOvr>
+    <a:masterClrMapping/>
+  </p:clrMapOvr>
+  <mc:AlternateContent xmlns:mc="http://schemas.openxmlformats.org/markup-compatibility/2006">
+    <mc:Choice xmlns:p14="http://schemas.microsoft.com/office/powerpoint/2010/main" Requires="p14">
+      <p:transition spd="med" p14:dur="700">
+        <p:fade/>
+      </p:transition>
+    </mc:Choice>
+    <mc:Fallback>
+      <p:transition spd="med">
+        <p:fade/>
+      </p:transition>
+    </mc:Fallback>
+  </mc:AlternateContent>
+  <p:timing>
+    <p:tnLst>
+      <p:par>
+        <p:cTn id="1" dur="indefinite" restart="never" nodeType="tmRoot"/>
+      </p:par>
+    </p:tnLst>
+  </p:timing>
+</p:sld>
+</file>
+
+<file path=ppt/slides/slide11.xml><?xml version="1.0" encoding="utf-8"?>
+<p:sld xmlns:a="http://schemas.openxmlformats.org/drawingml/2006/main" xmlns:r="http://schemas.openxmlformats.org/officeDocument/2006/relationships" xmlns:p="http://schemas.openxmlformats.org/presentationml/2006/main">
+  <p:cSld>
+    <p:spTree>
+      <p:nvGrpSpPr>
+        <p:cNvPr id="1" name=""/>
+        <p:cNvGrpSpPr/>
+        <p:nvPr/>
+      </p:nvGrpSpPr>
+      <p:grpSpPr>
+        <a:xfrm>
+          <a:off x="0" y="0"/>
+          <a:ext cx="0" cy="0"/>
+          <a:chOff x="0" y="0"/>
+          <a:chExt cx="0" cy="0"/>
+        </a:xfrm>
+      </p:grpSpPr>
+      <p:sp>
+        <p:nvSpPr>
           <p:cNvPr id="2" name="Título 1"/>
           <p:cNvSpPr>
             <a:spLocks noGrp="1"/>
@@ -5962,7 +6131,7 @@
 </p:sld>
 </file>
 
-<file path=ppt/slides/slide11.xml><?xml version="1.0" encoding="utf-8"?>
+<file path=ppt/slides/slide12.xml><?xml version="1.0" encoding="utf-8"?>
 <p:sld xmlns:a="http://schemas.openxmlformats.org/drawingml/2006/main" xmlns:r="http://schemas.openxmlformats.org/officeDocument/2006/relationships" xmlns:p="http://schemas.openxmlformats.org/presentationml/2006/main">
   <p:cSld>
     <p:spTree>
@@ -6213,7 +6382,7 @@
 </p:sld>
 </file>
 
-<file path=ppt/slides/slide12.xml><?xml version="1.0" encoding="utf-8"?>
+<file path=ppt/slides/slide13.xml><?xml version="1.0" encoding="utf-8"?>
 <p:sld xmlns:a="http://schemas.openxmlformats.org/drawingml/2006/main" xmlns:r="http://schemas.openxmlformats.org/officeDocument/2006/relationships" xmlns:p="http://schemas.openxmlformats.org/presentationml/2006/main">
   <p:cSld>
     <p:spTree>
@@ -6390,7 +6559,7 @@
 </p:sld>
 </file>
 
-<file path=ppt/slides/slide13.xml><?xml version="1.0" encoding="utf-8"?>
+<file path=ppt/slides/slide14.xml><?xml version="1.0" encoding="utf-8"?>
 <p:sld xmlns:a="http://schemas.openxmlformats.org/drawingml/2006/main" xmlns:r="http://schemas.openxmlformats.org/officeDocument/2006/relationships" xmlns:p="http://schemas.openxmlformats.org/presentationml/2006/main">
   <p:cSld>
     <p:spTree>
@@ -6726,7 +6895,7 @@
 </p:sld>
 </file>
 
-<file path=ppt/slides/slide14.xml><?xml version="1.0" encoding="utf-8"?>
+<file path=ppt/slides/slide15.xml><?xml version="1.0" encoding="utf-8"?>
 <p:sld xmlns:a="http://schemas.openxmlformats.org/drawingml/2006/main" xmlns:r="http://schemas.openxmlformats.org/officeDocument/2006/relationships" xmlns:p="http://schemas.openxmlformats.org/presentationml/2006/main">
   <p:cSld>
     <p:spTree>
@@ -7051,7 +7220,7 @@
 </p:sld>
 </file>
 
-<file path=ppt/slides/slide15.xml><?xml version="1.0" encoding="utf-8"?>
+<file path=ppt/slides/slide16.xml><?xml version="1.0" encoding="utf-8"?>
 <p:sld xmlns:a="http://schemas.openxmlformats.org/drawingml/2006/main" xmlns:r="http://schemas.openxmlformats.org/officeDocument/2006/relationships" xmlns:p="http://schemas.openxmlformats.org/presentationml/2006/main">
   <p:cSld>
     <p:spTree>
@@ -7085,23 +7254,7 @@
           <a:p>
             <a:r>
               <a:rPr lang="pt-PT" dirty="0" err="1" smtClean="0"/>
-              <a:t>Tracking</a:t>
-            </a:r>
-            <a:r>
-              <a:rPr lang="pt-PT" dirty="0" smtClean="0"/>
-              <a:t> </a:t>
-            </a:r>
-            <a:r>
-              <a:rPr lang="pt-PT" dirty="0" err="1" smtClean="0"/>
-              <a:t>and</a:t>
-            </a:r>
-            <a:r>
-              <a:rPr lang="pt-PT" dirty="0" smtClean="0"/>
-              <a:t> </a:t>
-            </a:r>
-            <a:r>
-              <a:rPr lang="pt-PT" dirty="0" err="1" smtClean="0"/>
-              <a:t>Control</a:t>
+              <a:t>Deliverables</a:t>
             </a:r>
             <a:endParaRPr lang="pt-PT" dirty="0"/>
           </a:p>
@@ -7119,153 +7272,19 @@
         </p:nvSpPr>
         <p:spPr/>
         <p:txBody>
-          <a:bodyPr/>
+          <a:bodyPr>
+            <a:normAutofit fontScale="70000" lnSpcReduction="20000"/>
+          </a:bodyPr>
           <a:lstStyle/>
           <a:p>
             <a:pPr lvl="1"/>
             <a:endParaRPr lang="pt-PT" dirty="0" smtClean="0"/>
           </a:p>
           <a:p>
-            <a:pPr lvl="1"/>
-            <a:r>
-              <a:rPr lang="pt-PT" dirty="0" err="1" smtClean="0"/>
-              <a:t>Earned</a:t>
-            </a:r>
-            <a:r>
-              <a:rPr lang="pt-PT" dirty="0" smtClean="0"/>
-              <a:t> </a:t>
-            </a:r>
-            <a:r>
-              <a:rPr lang="pt-PT" dirty="0" err="1" smtClean="0"/>
-              <a:t>Value</a:t>
-            </a:r>
-            <a:r>
-              <a:rPr lang="pt-PT" dirty="0" smtClean="0"/>
-              <a:t> </a:t>
-            </a:r>
-            <a:r>
-              <a:rPr lang="pt-PT" dirty="0" err="1" smtClean="0"/>
-              <a:t>Graph</a:t>
-            </a:r>
-            <a:endParaRPr lang="pt-PT" dirty="0" smtClean="0"/>
-          </a:p>
-          <a:p>
-            <a:pPr marL="231775" lvl="1" indent="0">
-              <a:buNone/>
-            </a:pPr>
-            <a:endParaRPr lang="pt-PT" dirty="0" smtClean="0"/>
-          </a:p>
-          <a:p>
-            <a:pPr lvl="1"/>
-            <a:r>
-              <a:rPr lang="pt-PT" dirty="0" err="1" smtClean="0"/>
-              <a:t>Risk</a:t>
-            </a:r>
-            <a:r>
-              <a:rPr lang="pt-PT" dirty="0" smtClean="0"/>
-              <a:t> </a:t>
-            </a:r>
-            <a:r>
-              <a:rPr lang="pt-PT" dirty="0" err="1" smtClean="0"/>
-              <a:t>Planning</a:t>
-            </a:r>
-            <a:r>
-              <a:rPr lang="pt-PT" dirty="0" smtClean="0"/>
-              <a:t> as </a:t>
-            </a:r>
-            <a:r>
-              <a:rPr lang="pt-PT" dirty="0" err="1" smtClean="0"/>
-              <a:t>part</a:t>
-            </a:r>
-            <a:r>
-              <a:rPr lang="pt-PT" dirty="0" smtClean="0"/>
-              <a:t> </a:t>
-            </a:r>
-            <a:r>
-              <a:rPr lang="pt-PT" dirty="0" err="1" smtClean="0"/>
-              <a:t>of</a:t>
-            </a:r>
-            <a:r>
-              <a:rPr lang="pt-PT" dirty="0" smtClean="0"/>
-              <a:t> a </a:t>
-            </a:r>
-            <a:r>
-              <a:rPr lang="pt-PT" dirty="0" err="1" smtClean="0"/>
-              <a:t>well</a:t>
-            </a:r>
-            <a:r>
-              <a:rPr lang="pt-PT" dirty="0" smtClean="0"/>
-              <a:t> </a:t>
-            </a:r>
-            <a:r>
-              <a:rPr lang="pt-PT" dirty="0" err="1" smtClean="0"/>
-              <a:t>tailored</a:t>
-            </a:r>
-            <a:r>
-              <a:rPr lang="pt-PT" dirty="0" smtClean="0"/>
-              <a:t> </a:t>
-            </a:r>
-            <a:r>
-              <a:rPr lang="pt-PT" dirty="0" err="1" smtClean="0"/>
-              <a:t>Assessment</a:t>
-            </a:r>
-            <a:r>
-              <a:rPr lang="pt-PT" dirty="0" smtClean="0"/>
-              <a:t> &amp; </a:t>
-            </a:r>
-            <a:r>
-              <a:rPr lang="pt-PT" dirty="0" err="1" smtClean="0"/>
-              <a:t>Control</a:t>
-            </a:r>
-            <a:r>
-              <a:rPr lang="pt-PT" dirty="0" smtClean="0"/>
-              <a:t> </a:t>
-            </a:r>
-            <a:r>
-              <a:rPr lang="pt-PT" dirty="0" err="1" smtClean="0"/>
-              <a:t>Process</a:t>
-            </a:r>
-            <a:endParaRPr lang="pt-PT" dirty="0" smtClean="0"/>
-          </a:p>
-          <a:p>
-            <a:pPr marL="231775" lvl="1" indent="0">
-              <a:buNone/>
-            </a:pPr>
-            <a:endParaRPr lang="pt-PT" dirty="0" smtClean="0"/>
-          </a:p>
-          <a:p>
-            <a:pPr lvl="1"/>
-            <a:r>
-              <a:rPr lang="pt-PT" dirty="0" err="1" smtClean="0"/>
-              <a:t>Weekly</a:t>
-            </a:r>
-            <a:r>
-              <a:rPr lang="pt-PT" dirty="0" smtClean="0"/>
-              <a:t> </a:t>
-            </a:r>
-            <a:r>
-              <a:rPr lang="pt-PT" dirty="0" err="1" smtClean="0"/>
-              <a:t>work</a:t>
-            </a:r>
-            <a:r>
-              <a:rPr lang="pt-PT" dirty="0" smtClean="0"/>
-              <a:t> </a:t>
-            </a:r>
-            <a:r>
-              <a:rPr lang="pt-PT" dirty="0" err="1" smtClean="0"/>
-              <a:t>logs</a:t>
-            </a:r>
-            <a:endParaRPr lang="pt-PT" dirty="0"/>
-          </a:p>
-          <a:p>
-            <a:pPr lvl="1"/>
-            <a:endParaRPr lang="pt-PT" dirty="0" smtClean="0"/>
-          </a:p>
-          <a:p>
-            <a:pPr lvl="1"/>
+            <a:pPr lvl="0"/>
             <a:r>
               <a:rPr lang="pt-PT" dirty="0" err="1"/>
-              <a:t>Weekly</a:t>
+              <a:t>Vision</a:t>
             </a:r>
             <a:r>
               <a:rPr lang="pt-PT" dirty="0"/>
@@ -7273,13 +7292,149 @@
             </a:r>
             <a:r>
               <a:rPr lang="pt-PT" dirty="0" err="1"/>
+              <a:t>and</a:t>
+            </a:r>
+            <a:r>
+              <a:rPr lang="pt-PT" dirty="0"/>
+              <a:t> </a:t>
+            </a:r>
+            <a:r>
+              <a:rPr lang="pt-PT" dirty="0" smtClean="0"/>
+              <a:t>Scope</a:t>
+            </a:r>
+            <a:endParaRPr lang="pt-PT" dirty="0"/>
+          </a:p>
+          <a:p>
+            <a:pPr lvl="0"/>
+            <a:r>
+              <a:rPr lang="pt-PT" dirty="0"/>
+              <a:t>Software </a:t>
+            </a:r>
+            <a:r>
+              <a:rPr lang="pt-PT" dirty="0" err="1"/>
+              <a:t>Development</a:t>
+            </a:r>
+            <a:r>
+              <a:rPr lang="pt-PT" dirty="0"/>
+              <a:t> </a:t>
+            </a:r>
+            <a:r>
+              <a:rPr lang="pt-PT" dirty="0" err="1" smtClean="0"/>
+              <a:t>Plan</a:t>
+            </a:r>
+            <a:endParaRPr lang="pt-PT" dirty="0"/>
+          </a:p>
+          <a:p>
+            <a:pPr lvl="0"/>
+            <a:r>
+              <a:rPr lang="pt-PT" dirty="0" err="1"/>
+              <a:t>Quality</a:t>
+            </a:r>
+            <a:r>
+              <a:rPr lang="pt-PT" dirty="0"/>
+              <a:t> </a:t>
+            </a:r>
+            <a:r>
+              <a:rPr lang="pt-PT" dirty="0" err="1" smtClean="0"/>
+              <a:t>Plan</a:t>
+            </a:r>
+            <a:endParaRPr lang="pt-PT" dirty="0"/>
+          </a:p>
+          <a:p>
+            <a:pPr lvl="0"/>
+            <a:r>
+              <a:rPr lang="pt-PT" dirty="0" err="1"/>
+              <a:t>Test</a:t>
+            </a:r>
+            <a:r>
+              <a:rPr lang="pt-PT" dirty="0"/>
+              <a:t> </a:t>
+            </a:r>
+            <a:r>
+              <a:rPr lang="pt-PT" dirty="0" err="1" smtClean="0"/>
+              <a:t>Plan</a:t>
+            </a:r>
+            <a:endParaRPr lang="pt-PT" dirty="0"/>
+          </a:p>
+          <a:p>
+            <a:pPr lvl="0"/>
+            <a:r>
+              <a:rPr lang="pt-PT" dirty="0"/>
+              <a:t>Software </a:t>
+            </a:r>
+            <a:r>
+              <a:rPr lang="pt-PT" dirty="0" err="1"/>
+              <a:t>Requirements</a:t>
+            </a:r>
+            <a:r>
+              <a:rPr lang="pt-PT" dirty="0"/>
+              <a:t> </a:t>
+            </a:r>
+            <a:r>
+              <a:rPr lang="pt-PT" dirty="0" err="1" smtClean="0"/>
+              <a:t>Specification</a:t>
+            </a:r>
+            <a:endParaRPr lang="pt-PT" dirty="0"/>
+          </a:p>
+          <a:p>
+            <a:pPr lvl="0"/>
+            <a:r>
+              <a:rPr lang="pt-PT" dirty="0" err="1"/>
+              <a:t>Risk</a:t>
+            </a:r>
+            <a:r>
+              <a:rPr lang="pt-PT" dirty="0"/>
+              <a:t> </a:t>
+            </a:r>
+            <a:r>
+              <a:rPr lang="pt-PT" dirty="0" err="1" smtClean="0"/>
+              <a:t>Plan</a:t>
+            </a:r>
+            <a:endParaRPr lang="pt-PT" dirty="0"/>
+          </a:p>
+          <a:p>
+            <a:pPr lvl="0"/>
+            <a:r>
+              <a:rPr lang="en-US" dirty="0"/>
+              <a:t>Software source code and </a:t>
+            </a:r>
+            <a:r>
+              <a:rPr lang="en-US" dirty="0" smtClean="0"/>
+              <a:t>binaries</a:t>
+            </a:r>
+            <a:endParaRPr lang="pt-PT" dirty="0"/>
+          </a:p>
+          <a:p>
+            <a:pPr lvl="0"/>
+            <a:r>
+              <a:rPr lang="pt-PT" dirty="0" err="1"/>
+              <a:t>Review</a:t>
+            </a:r>
+            <a:r>
+              <a:rPr lang="pt-PT" dirty="0"/>
+              <a:t> </a:t>
+            </a:r>
+            <a:r>
+              <a:rPr lang="pt-PT" dirty="0" err="1" smtClean="0"/>
               <a:t>Reports</a:t>
             </a:r>
             <a:endParaRPr lang="pt-PT" dirty="0"/>
           </a:p>
           <a:p>
-            <a:pPr lvl="1"/>
-            <a:endParaRPr lang="pt-PT" dirty="0" smtClean="0"/>
+            <a:pPr lvl="0"/>
+            <a:r>
+              <a:rPr lang="pt-PT" dirty="0" err="1"/>
+              <a:t>Post-Mortem</a:t>
+            </a:r>
+            <a:r>
+              <a:rPr lang="pt-PT" dirty="0"/>
+              <a:t> </a:t>
+            </a:r>
+            <a:r>
+              <a:rPr lang="pt-PT" dirty="0" err="1" smtClean="0"/>
+              <a:t>Report</a:t>
+            </a:r>
+            <a:endParaRPr lang="pt-PT" dirty="0"/>
           </a:p>
         </p:txBody>
       </p:sp>
@@ -7315,105 +7470,6 @@
 </p:sld>
 </file>
 
-<file path=ppt/slides/slide16.xml><?xml version="1.0" encoding="utf-8"?>
-<p:sld xmlns:a="http://schemas.openxmlformats.org/drawingml/2006/main" xmlns:r="http://schemas.openxmlformats.org/officeDocument/2006/relationships" xmlns:p="http://schemas.openxmlformats.org/presentationml/2006/main">
-  <p:cSld>
-    <p:spTree>
-      <p:nvGrpSpPr>
-        <p:cNvPr id="1" name=""/>
-        <p:cNvGrpSpPr/>
-        <p:nvPr/>
-      </p:nvGrpSpPr>
-      <p:grpSpPr>
-        <a:xfrm>
-          <a:off x="0" y="0"/>
-          <a:ext cx="0" cy="0"/>
-          <a:chOff x="0" y="0"/>
-          <a:chExt cx="0" cy="0"/>
-        </a:xfrm>
-      </p:grpSpPr>
-      <p:sp>
-        <p:nvSpPr>
-          <p:cNvPr id="2" name="Título 1"/>
-          <p:cNvSpPr>
-            <a:spLocks noGrp="1"/>
-          </p:cNvSpPr>
-          <p:nvPr>
-            <p:ph type="title"/>
-          </p:nvPr>
-        </p:nvSpPr>
-        <p:spPr/>
-        <p:txBody>
-          <a:bodyPr/>
-          <a:lstStyle/>
-          <a:p>
-            <a:r>
-              <a:rPr lang="pt-PT" dirty="0" err="1" smtClean="0"/>
-              <a:t>Quality</a:t>
-            </a:r>
-            <a:r>
-              <a:rPr lang="pt-PT" dirty="0" smtClean="0"/>
-              <a:t> </a:t>
-            </a:r>
-            <a:r>
-              <a:rPr lang="pt-PT" dirty="0" err="1" smtClean="0"/>
-              <a:t>Plan</a:t>
-            </a:r>
-            <a:endParaRPr lang="pt-PT" dirty="0"/>
-          </a:p>
-        </p:txBody>
-      </p:sp>
-      <p:sp>
-        <p:nvSpPr>
-          <p:cNvPr id="3" name="Marcador de Posição do Texto 2"/>
-          <p:cNvSpPr>
-            <a:spLocks noGrp="1"/>
-          </p:cNvSpPr>
-          <p:nvPr>
-            <p:ph type="body" idx="1"/>
-          </p:nvPr>
-        </p:nvSpPr>
-        <p:spPr/>
-        <p:txBody>
-          <a:bodyPr/>
-          <a:lstStyle/>
-          <a:p>
-            <a:endParaRPr lang="pt-PT" dirty="0"/>
-          </a:p>
-        </p:txBody>
-      </p:sp>
-    </p:spTree>
-    <p:extLst>
-      <p:ext uri="{BB962C8B-B14F-4D97-AF65-F5344CB8AC3E}">
-        <p14:creationId xmlns:p14="http://schemas.microsoft.com/office/powerpoint/2010/main" val="3807610476"/>
-      </p:ext>
-    </p:extLst>
-  </p:cSld>
-  <p:clrMapOvr>
-    <a:masterClrMapping/>
-  </p:clrMapOvr>
-  <mc:AlternateContent xmlns:mc="http://schemas.openxmlformats.org/markup-compatibility/2006" xmlns:p14="http://schemas.microsoft.com/office/powerpoint/2010/main">
-    <mc:Choice Requires="p14">
-      <p:transition spd="med" p14:dur="700">
-        <p:fade/>
-      </p:transition>
-    </mc:Choice>
-    <mc:Fallback xmlns="">
-      <p:transition spd="med">
-        <p:fade/>
-      </p:transition>
-    </mc:Fallback>
-  </mc:AlternateContent>
-  <p:timing>
-    <p:tnLst>
-      <p:par>
-        <p:cTn id="1" dur="indefinite" restart="never" nodeType="tmRoot"/>
-      </p:par>
-    </p:tnLst>
-  </p:timing>
-</p:sld>
-</file>
-
 <file path=ppt/slides/slide17.xml><?xml version="1.0" encoding="utf-8"?>
 <p:sld xmlns:a="http://schemas.openxmlformats.org/drawingml/2006/main" xmlns:r="http://schemas.openxmlformats.org/officeDocument/2006/relationships" xmlns:p="http://schemas.openxmlformats.org/presentationml/2006/main">
   <p:cSld>
@@ -7448,7 +7504,7 @@
           <a:p>
             <a:r>
               <a:rPr lang="pt-PT" dirty="0" err="1" smtClean="0"/>
-              <a:t>Quality</a:t>
+              <a:t>Tracking</a:t>
             </a:r>
             <a:r>
               <a:rPr lang="pt-PT" dirty="0" smtClean="0"/>
@@ -7456,7 +7512,15 @@
             </a:r>
             <a:r>
               <a:rPr lang="pt-PT" dirty="0" err="1" smtClean="0"/>
-              <a:t>Plan</a:t>
+              <a:t>and</a:t>
+            </a:r>
+            <a:r>
+              <a:rPr lang="pt-PT" dirty="0" smtClean="0"/>
+              <a:t> </a:t>
+            </a:r>
+            <a:r>
+              <a:rPr lang="pt-PT" dirty="0" err="1" smtClean="0"/>
+              <a:t>Control</a:t>
             </a:r>
             <a:endParaRPr lang="pt-PT" dirty="0"/>
           </a:p>
@@ -7477,59 +7541,163 @@
           <a:bodyPr/>
           <a:lstStyle/>
           <a:p>
-            <a:r>
-              <a:rPr lang="en-US" dirty="0" smtClean="0"/>
-              <a:t>Quality </a:t>
-            </a:r>
-            <a:r>
-              <a:rPr lang="en-US" dirty="0"/>
-              <a:t>goals</a:t>
-            </a:r>
-          </a:p>
-          <a:p>
             <a:pPr lvl="1"/>
-            <a:r>
-              <a:rPr lang="en-US" dirty="0"/>
-              <a:t>Assure all processes are followed</a:t>
-            </a:r>
+            <a:endParaRPr lang="pt-PT" dirty="0" smtClean="0"/>
           </a:p>
           <a:p>
             <a:pPr lvl="1"/>
             <a:r>
-              <a:rPr lang="en-US" dirty="0"/>
-              <a:t>Assure the realization of reviews both to documents and code</a:t>
-            </a:r>
-          </a:p>
-          <a:p>
-            <a:pPr lvl="2"/>
-            <a:r>
-              <a:rPr lang="en-US" dirty="0"/>
-              <a:t>Inspections</a:t>
-            </a:r>
-          </a:p>
-          <a:p>
-            <a:pPr lvl="2"/>
-            <a:r>
-              <a:rPr lang="en-US" dirty="0"/>
-              <a:t>Walkthrough</a:t>
-            </a:r>
-          </a:p>
-          <a:p>
-            <a:pPr lvl="2"/>
-            <a:r>
-              <a:rPr lang="en-US" dirty="0" err="1"/>
-              <a:t>Deskcheck</a:t>
-            </a:r>
-            <a:endParaRPr lang="en-US" dirty="0"/>
+              <a:rPr lang="pt-PT" dirty="0" err="1" smtClean="0"/>
+              <a:t>Earned</a:t>
+            </a:r>
+            <a:r>
+              <a:rPr lang="pt-PT" dirty="0" smtClean="0"/>
+              <a:t> </a:t>
+            </a:r>
+            <a:r>
+              <a:rPr lang="pt-PT" dirty="0" err="1" smtClean="0"/>
+              <a:t>Value</a:t>
+            </a:r>
+            <a:r>
+              <a:rPr lang="pt-PT" dirty="0" smtClean="0"/>
+              <a:t> </a:t>
+            </a:r>
+            <a:r>
+              <a:rPr lang="pt-PT" dirty="0" err="1" smtClean="0"/>
+              <a:t>Graph</a:t>
+            </a:r>
+            <a:endParaRPr lang="pt-PT" dirty="0" smtClean="0"/>
+          </a:p>
+          <a:p>
+            <a:pPr marL="231775" lvl="1" indent="0">
+              <a:buNone/>
+            </a:pPr>
+            <a:endParaRPr lang="pt-PT" dirty="0" smtClean="0"/>
           </a:p>
           <a:p>
             <a:pPr lvl="1"/>
             <a:r>
-              <a:rPr lang="en-US" dirty="0"/>
-              <a:t>Coding Standards are defined and followed</a:t>
-            </a:r>
-          </a:p>
-          <a:p>
+              <a:rPr lang="pt-PT" dirty="0" err="1" smtClean="0"/>
+              <a:t>Risk</a:t>
+            </a:r>
+            <a:r>
+              <a:rPr lang="pt-PT" dirty="0" smtClean="0"/>
+              <a:t> </a:t>
+            </a:r>
+            <a:r>
+              <a:rPr lang="pt-PT" dirty="0" err="1" smtClean="0"/>
+              <a:t>Planning</a:t>
+            </a:r>
+            <a:r>
+              <a:rPr lang="pt-PT" dirty="0" smtClean="0"/>
+              <a:t> as </a:t>
+            </a:r>
+            <a:r>
+              <a:rPr lang="pt-PT" dirty="0" err="1" smtClean="0"/>
+              <a:t>part</a:t>
+            </a:r>
+            <a:r>
+              <a:rPr lang="pt-PT" dirty="0" smtClean="0"/>
+              <a:t> </a:t>
+            </a:r>
+            <a:r>
+              <a:rPr lang="pt-PT" dirty="0" err="1" smtClean="0"/>
+              <a:t>of</a:t>
+            </a:r>
+            <a:r>
+              <a:rPr lang="pt-PT" dirty="0" smtClean="0"/>
+              <a:t> a </a:t>
+            </a:r>
+            <a:r>
+              <a:rPr lang="pt-PT" dirty="0" err="1" smtClean="0"/>
+              <a:t>well</a:t>
+            </a:r>
+            <a:r>
+              <a:rPr lang="pt-PT" dirty="0" smtClean="0"/>
+              <a:t> </a:t>
+            </a:r>
+            <a:r>
+              <a:rPr lang="pt-PT" dirty="0" err="1" smtClean="0"/>
+              <a:t>tailored</a:t>
+            </a:r>
+            <a:r>
+              <a:rPr lang="pt-PT" dirty="0" smtClean="0"/>
+              <a:t> </a:t>
+            </a:r>
+            <a:r>
+              <a:rPr lang="pt-PT" dirty="0" err="1" smtClean="0"/>
+              <a:t>Assessment</a:t>
+            </a:r>
+            <a:r>
+              <a:rPr lang="pt-PT" dirty="0" smtClean="0"/>
+              <a:t> &amp; </a:t>
+            </a:r>
+            <a:r>
+              <a:rPr lang="pt-PT" dirty="0" err="1" smtClean="0"/>
+              <a:t>Control</a:t>
+            </a:r>
+            <a:r>
+              <a:rPr lang="pt-PT" dirty="0" smtClean="0"/>
+              <a:t> </a:t>
+            </a:r>
+            <a:r>
+              <a:rPr lang="pt-PT" dirty="0" err="1" smtClean="0"/>
+              <a:t>Process</a:t>
+            </a:r>
+            <a:endParaRPr lang="pt-PT" dirty="0" smtClean="0"/>
+          </a:p>
+          <a:p>
+            <a:pPr marL="231775" lvl="1" indent="0">
+              <a:buNone/>
+            </a:pPr>
+            <a:endParaRPr lang="pt-PT" dirty="0" smtClean="0"/>
+          </a:p>
+          <a:p>
+            <a:pPr lvl="1"/>
+            <a:r>
+              <a:rPr lang="pt-PT" dirty="0" err="1" smtClean="0"/>
+              <a:t>Weekly</a:t>
+            </a:r>
+            <a:r>
+              <a:rPr lang="pt-PT" dirty="0" smtClean="0"/>
+              <a:t> </a:t>
+            </a:r>
+            <a:r>
+              <a:rPr lang="pt-PT" dirty="0" err="1" smtClean="0"/>
+              <a:t>work</a:t>
+            </a:r>
+            <a:r>
+              <a:rPr lang="pt-PT" dirty="0" smtClean="0"/>
+              <a:t> </a:t>
+            </a:r>
+            <a:r>
+              <a:rPr lang="pt-PT" dirty="0" err="1" smtClean="0"/>
+              <a:t>logs</a:t>
+            </a:r>
+            <a:endParaRPr lang="pt-PT" dirty="0"/>
+          </a:p>
+          <a:p>
+            <a:pPr lvl="1"/>
+            <a:endParaRPr lang="pt-PT" dirty="0" smtClean="0"/>
+          </a:p>
+          <a:p>
+            <a:pPr lvl="1"/>
+            <a:r>
+              <a:rPr lang="pt-PT" dirty="0" err="1"/>
+              <a:t>Weekly</a:t>
+            </a:r>
+            <a:r>
+              <a:rPr lang="pt-PT" dirty="0"/>
+              <a:t> </a:t>
+            </a:r>
+            <a:r>
+              <a:rPr lang="pt-PT" dirty="0" err="1"/>
+              <a:t>Reports</a:t>
+            </a:r>
+            <a:endParaRPr lang="pt-PT" dirty="0"/>
+          </a:p>
+          <a:p>
+            <a:pPr lvl="1"/>
             <a:endParaRPr lang="pt-PT" dirty="0" smtClean="0"/>
           </a:p>
         </p:txBody>
@@ -7537,7 +7705,7 @@
     </p:spTree>
     <p:extLst>
       <p:ext uri="{BB962C8B-B14F-4D97-AF65-F5344CB8AC3E}">
-        <p14:creationId xmlns:p14="http://schemas.microsoft.com/office/powerpoint/2010/main" val="723436804"/>
+        <p14:creationId xmlns:p14="http://schemas.microsoft.com/office/powerpoint/2010/main" val="1042846505"/>
       </p:ext>
     </p:extLst>
   </p:cSld>
@@ -7585,6 +7753,405 @@
       </p:grpSpPr>
       <p:sp>
         <p:nvSpPr>
+          <p:cNvPr id="2" name="Título 1"/>
+          <p:cNvSpPr>
+            <a:spLocks noGrp="1"/>
+          </p:cNvSpPr>
+          <p:nvPr>
+            <p:ph type="title"/>
+          </p:nvPr>
+        </p:nvSpPr>
+        <p:spPr/>
+        <p:txBody>
+          <a:bodyPr/>
+          <a:lstStyle/>
+          <a:p>
+            <a:r>
+              <a:rPr lang="pt-PT" dirty="0" err="1" smtClean="0"/>
+              <a:t>Quality</a:t>
+            </a:r>
+            <a:r>
+              <a:rPr lang="pt-PT" dirty="0" smtClean="0"/>
+              <a:t> </a:t>
+            </a:r>
+            <a:r>
+              <a:rPr lang="pt-PT" dirty="0" err="1" smtClean="0"/>
+              <a:t>Plan</a:t>
+            </a:r>
+            <a:endParaRPr lang="pt-PT" dirty="0"/>
+          </a:p>
+        </p:txBody>
+      </p:sp>
+      <p:sp>
+        <p:nvSpPr>
+          <p:cNvPr id="3" name="Marcador de Posição do Texto 2"/>
+          <p:cNvSpPr>
+            <a:spLocks noGrp="1"/>
+          </p:cNvSpPr>
+          <p:nvPr>
+            <p:ph type="body" idx="1"/>
+          </p:nvPr>
+        </p:nvSpPr>
+        <p:spPr/>
+        <p:txBody>
+          <a:bodyPr/>
+          <a:lstStyle/>
+          <a:p>
+            <a:endParaRPr lang="pt-PT" dirty="0"/>
+          </a:p>
+        </p:txBody>
+      </p:sp>
+    </p:spTree>
+    <p:extLst>
+      <p:ext uri="{BB962C8B-B14F-4D97-AF65-F5344CB8AC3E}">
+        <p14:creationId xmlns:p14="http://schemas.microsoft.com/office/powerpoint/2010/main" val="3807610476"/>
+      </p:ext>
+    </p:extLst>
+  </p:cSld>
+  <p:clrMapOvr>
+    <a:masterClrMapping/>
+  </p:clrMapOvr>
+  <mc:AlternateContent xmlns:mc="http://schemas.openxmlformats.org/markup-compatibility/2006" xmlns:p14="http://schemas.microsoft.com/office/powerpoint/2010/main">
+    <mc:Choice Requires="p14">
+      <p:transition spd="med" p14:dur="700">
+        <p:fade/>
+      </p:transition>
+    </mc:Choice>
+    <mc:Fallback xmlns="">
+      <p:transition spd="med">
+        <p:fade/>
+      </p:transition>
+    </mc:Fallback>
+  </mc:AlternateContent>
+  <p:timing>
+    <p:tnLst>
+      <p:par>
+        <p:cTn id="1" dur="indefinite" restart="never" nodeType="tmRoot"/>
+      </p:par>
+    </p:tnLst>
+  </p:timing>
+</p:sld>
+</file>
+
+<file path=ppt/slides/slide19.xml><?xml version="1.0" encoding="utf-8"?>
+<p:sld xmlns:a="http://schemas.openxmlformats.org/drawingml/2006/main" xmlns:r="http://schemas.openxmlformats.org/officeDocument/2006/relationships" xmlns:p="http://schemas.openxmlformats.org/presentationml/2006/main">
+  <p:cSld>
+    <p:spTree>
+      <p:nvGrpSpPr>
+        <p:cNvPr id="1" name=""/>
+        <p:cNvGrpSpPr/>
+        <p:nvPr/>
+      </p:nvGrpSpPr>
+      <p:grpSpPr>
+        <a:xfrm>
+          <a:off x="0" y="0"/>
+          <a:ext cx="0" cy="0"/>
+          <a:chOff x="0" y="0"/>
+          <a:chExt cx="0" cy="0"/>
+        </a:xfrm>
+      </p:grpSpPr>
+      <p:sp>
+        <p:nvSpPr>
+          <p:cNvPr id="13" name="Título 12"/>
+          <p:cNvSpPr>
+            <a:spLocks noGrp="1"/>
+          </p:cNvSpPr>
+          <p:nvPr>
+            <p:ph type="title"/>
+          </p:nvPr>
+        </p:nvSpPr>
+        <p:spPr/>
+        <p:txBody>
+          <a:bodyPr/>
+          <a:lstStyle/>
+          <a:p>
+            <a:r>
+              <a:rPr lang="pt-PT" dirty="0" err="1" smtClean="0"/>
+              <a:t>Quality</a:t>
+            </a:r>
+            <a:r>
+              <a:rPr lang="pt-PT" dirty="0" smtClean="0"/>
+              <a:t> </a:t>
+            </a:r>
+            <a:r>
+              <a:rPr lang="pt-PT" dirty="0" err="1" smtClean="0"/>
+              <a:t>Plan</a:t>
+            </a:r>
+            <a:endParaRPr lang="pt-PT" dirty="0"/>
+          </a:p>
+        </p:txBody>
+      </p:sp>
+      <p:sp>
+        <p:nvSpPr>
+          <p:cNvPr id="14" name="Marcador de Posição de Conteúdo 13"/>
+          <p:cNvSpPr>
+            <a:spLocks noGrp="1"/>
+          </p:cNvSpPr>
+          <p:nvPr>
+            <p:ph idx="1"/>
+          </p:nvPr>
+        </p:nvSpPr>
+        <p:spPr/>
+        <p:txBody>
+          <a:bodyPr/>
+          <a:lstStyle/>
+          <a:p>
+            <a:r>
+              <a:rPr lang="en-US" dirty="0" smtClean="0"/>
+              <a:t>Quality </a:t>
+            </a:r>
+            <a:r>
+              <a:rPr lang="en-US" dirty="0"/>
+              <a:t>goals</a:t>
+            </a:r>
+          </a:p>
+          <a:p>
+            <a:pPr lvl="1"/>
+            <a:r>
+              <a:rPr lang="en-US" dirty="0"/>
+              <a:t>Assure all processes are followed</a:t>
+            </a:r>
+          </a:p>
+          <a:p>
+            <a:pPr lvl="1"/>
+            <a:r>
+              <a:rPr lang="en-US" dirty="0"/>
+              <a:t>Assure the realization of reviews both to documents and code</a:t>
+            </a:r>
+          </a:p>
+          <a:p>
+            <a:pPr lvl="2"/>
+            <a:r>
+              <a:rPr lang="en-US" dirty="0"/>
+              <a:t>Inspections</a:t>
+            </a:r>
+          </a:p>
+          <a:p>
+            <a:pPr lvl="2"/>
+            <a:r>
+              <a:rPr lang="en-US" dirty="0"/>
+              <a:t>Walkthrough</a:t>
+            </a:r>
+          </a:p>
+          <a:p>
+            <a:pPr lvl="2"/>
+            <a:r>
+              <a:rPr lang="en-US" dirty="0" err="1"/>
+              <a:t>Deskcheck</a:t>
+            </a:r>
+            <a:endParaRPr lang="en-US" dirty="0"/>
+          </a:p>
+          <a:p>
+            <a:pPr lvl="1"/>
+            <a:r>
+              <a:rPr lang="en-US" dirty="0"/>
+              <a:t>Coding Standards are defined and followed</a:t>
+            </a:r>
+          </a:p>
+          <a:p>
+            <a:endParaRPr lang="pt-PT" dirty="0" smtClean="0"/>
+          </a:p>
+        </p:txBody>
+      </p:sp>
+    </p:spTree>
+    <p:extLst>
+      <p:ext uri="{BB962C8B-B14F-4D97-AF65-F5344CB8AC3E}">
+        <p14:creationId xmlns:p14="http://schemas.microsoft.com/office/powerpoint/2010/main" val="723436804"/>
+      </p:ext>
+    </p:extLst>
+  </p:cSld>
+  <p:clrMapOvr>
+    <a:masterClrMapping/>
+  </p:clrMapOvr>
+  <mc:AlternateContent xmlns:mc="http://schemas.openxmlformats.org/markup-compatibility/2006">
+    <mc:Choice xmlns:p14="http://schemas.microsoft.com/office/powerpoint/2010/main" Requires="p14">
+      <p:transition spd="med" p14:dur="700">
+        <p:fade/>
+      </p:transition>
+    </mc:Choice>
+    <mc:Fallback>
+      <p:transition spd="med">
+        <p:fade/>
+      </p:transition>
+    </mc:Fallback>
+  </mc:AlternateContent>
+  <p:timing>
+    <p:tnLst>
+      <p:par>
+        <p:cTn id="1" dur="indefinite" restart="never" nodeType="tmRoot"/>
+      </p:par>
+    </p:tnLst>
+  </p:timing>
+</p:sld>
+</file>
+
+<file path=ppt/slides/slide2.xml><?xml version="1.0" encoding="utf-8"?>
+<p:sld xmlns:a="http://schemas.openxmlformats.org/drawingml/2006/main" xmlns:r="http://schemas.openxmlformats.org/officeDocument/2006/relationships" xmlns:p="http://schemas.openxmlformats.org/presentationml/2006/main">
+  <p:cSld>
+    <p:spTree>
+      <p:nvGrpSpPr>
+        <p:cNvPr id="1" name=""/>
+        <p:cNvGrpSpPr/>
+        <p:nvPr/>
+      </p:nvGrpSpPr>
+      <p:grpSpPr>
+        <a:xfrm>
+          <a:off x="0" y="0"/>
+          <a:ext cx="0" cy="0"/>
+          <a:chOff x="0" y="0"/>
+          <a:chExt cx="0" cy="0"/>
+        </a:xfrm>
+      </p:grpSpPr>
+      <p:sp>
+        <p:nvSpPr>
+          <p:cNvPr id="13" name="Título 12"/>
+          <p:cNvSpPr>
+            <a:spLocks noGrp="1"/>
+          </p:cNvSpPr>
+          <p:nvPr>
+            <p:ph type="title"/>
+          </p:nvPr>
+        </p:nvSpPr>
+        <p:spPr/>
+        <p:txBody>
+          <a:bodyPr/>
+          <a:lstStyle/>
+          <a:p>
+            <a:r>
+              <a:rPr lang="pt-PT" dirty="0" err="1" smtClean="0"/>
+              <a:t>Index</a:t>
+            </a:r>
+            <a:endParaRPr lang="pt-PT" dirty="0"/>
+          </a:p>
+        </p:txBody>
+      </p:sp>
+      <p:sp>
+        <p:nvSpPr>
+          <p:cNvPr id="14" name="Marcador de Posição de Conteúdo 13"/>
+          <p:cNvSpPr>
+            <a:spLocks noGrp="1"/>
+          </p:cNvSpPr>
+          <p:nvPr>
+            <p:ph idx="1"/>
+          </p:nvPr>
+        </p:nvSpPr>
+        <p:spPr/>
+        <p:txBody>
+          <a:bodyPr/>
+          <a:lstStyle/>
+          <a:p>
+            <a:r>
+              <a:rPr lang="pt-PT" dirty="0" smtClean="0"/>
+              <a:t>Team </a:t>
+            </a:r>
+            <a:r>
+              <a:rPr lang="pt-PT" dirty="0" err="1" smtClean="0"/>
+              <a:t>Introduction</a:t>
+            </a:r>
+            <a:endParaRPr lang="pt-PT" dirty="0" smtClean="0"/>
+          </a:p>
+          <a:p>
+            <a:r>
+              <a:rPr lang="pt-PT" dirty="0" err="1" smtClean="0"/>
+              <a:t>Vision</a:t>
+            </a:r>
+            <a:r>
+              <a:rPr lang="pt-PT" dirty="0" smtClean="0"/>
+              <a:t> </a:t>
+            </a:r>
+            <a:r>
+              <a:rPr lang="pt-PT" dirty="0" err="1" smtClean="0"/>
+              <a:t>and</a:t>
+            </a:r>
+            <a:r>
+              <a:rPr lang="pt-PT" dirty="0" smtClean="0"/>
+              <a:t> Scope</a:t>
+            </a:r>
+            <a:endParaRPr lang="pt-PT" dirty="0" smtClean="0"/>
+          </a:p>
+          <a:p>
+            <a:r>
+              <a:rPr lang="pt-PT" dirty="0" err="1" smtClean="0"/>
+              <a:t>Development</a:t>
+            </a:r>
+            <a:r>
+              <a:rPr lang="pt-PT" dirty="0" smtClean="0"/>
+              <a:t> </a:t>
+            </a:r>
+            <a:r>
+              <a:rPr lang="pt-PT" dirty="0" err="1" smtClean="0"/>
+              <a:t>Plan</a:t>
+            </a:r>
+            <a:endParaRPr lang="pt-PT" dirty="0" smtClean="0"/>
+          </a:p>
+          <a:p>
+            <a:r>
+              <a:rPr lang="pt-PT" dirty="0" err="1" smtClean="0"/>
+              <a:t>Quality</a:t>
+            </a:r>
+            <a:r>
+              <a:rPr lang="pt-PT" dirty="0" smtClean="0"/>
+              <a:t> </a:t>
+            </a:r>
+            <a:r>
+              <a:rPr lang="pt-PT" dirty="0" err="1" smtClean="0"/>
+              <a:t>Plan</a:t>
+            </a:r>
+            <a:endParaRPr lang="pt-PT" dirty="0" smtClean="0"/>
+          </a:p>
+        </p:txBody>
+      </p:sp>
+    </p:spTree>
+    <p:extLst>
+      <p:ext uri="{BB962C8B-B14F-4D97-AF65-F5344CB8AC3E}">
+        <p14:creationId xmlns:p14="http://schemas.microsoft.com/office/powerpoint/2010/main" val="2139132589"/>
+      </p:ext>
+    </p:extLst>
+  </p:cSld>
+  <p:clrMapOvr>
+    <a:masterClrMapping/>
+  </p:clrMapOvr>
+  <mc:AlternateContent xmlns:mc="http://schemas.openxmlformats.org/markup-compatibility/2006" xmlns:p14="http://schemas.microsoft.com/office/powerpoint/2010/main">
+    <mc:Choice Requires="p14">
+      <p:transition spd="med" p14:dur="700">
+        <p:fade/>
+      </p:transition>
+    </mc:Choice>
+    <mc:Fallback xmlns="">
+      <p:transition spd="med">
+        <p:fade/>
+      </p:transition>
+    </mc:Fallback>
+  </mc:AlternateContent>
+  <p:timing>
+    <p:tnLst>
+      <p:par>
+        <p:cTn id="1" dur="indefinite" restart="never" nodeType="tmRoot"/>
+      </p:par>
+    </p:tnLst>
+  </p:timing>
+</p:sld>
+</file>
+
+<file path=ppt/slides/slide20.xml><?xml version="1.0" encoding="utf-8"?>
+<p:sld xmlns:a="http://schemas.openxmlformats.org/drawingml/2006/main" xmlns:r="http://schemas.openxmlformats.org/officeDocument/2006/relationships" xmlns:p="http://schemas.openxmlformats.org/presentationml/2006/main">
+  <p:cSld>
+    <p:spTree>
+      <p:nvGrpSpPr>
+        <p:cNvPr id="1" name=""/>
+        <p:cNvGrpSpPr/>
+        <p:nvPr/>
+      </p:nvGrpSpPr>
+      <p:grpSpPr>
+        <a:xfrm>
+          <a:off x="0" y="0"/>
+          <a:ext cx="0" cy="0"/>
+          <a:chOff x="0" y="0"/>
+          <a:chExt cx="0" cy="0"/>
+        </a:xfrm>
+      </p:grpSpPr>
+      <p:sp>
+        <p:nvSpPr>
           <p:cNvPr id="13" name="Título 12"/>
           <p:cNvSpPr>
             <a:spLocks noGrp="1"/>
@@ -7726,7 +8293,7 @@
 </p:sld>
 </file>
 
-<file path=ppt/slides/slide19.xml><?xml version="1.0" encoding="utf-8"?>
+<file path=ppt/slides/slide21.xml><?xml version="1.0" encoding="utf-8"?>
 <p:sld xmlns:a="http://schemas.openxmlformats.org/drawingml/2006/main" xmlns:r="http://schemas.openxmlformats.org/officeDocument/2006/relationships" xmlns:p="http://schemas.openxmlformats.org/presentationml/2006/main">
   <p:cSld>
     <p:spTree>
@@ -7793,149 +8360,6 @@
     <p:extLst>
       <p:ext uri="{BB962C8B-B14F-4D97-AF65-F5344CB8AC3E}">
         <p14:creationId xmlns:p14="http://schemas.microsoft.com/office/powerpoint/2010/main" val="2478160142"/>
-      </p:ext>
-    </p:extLst>
-  </p:cSld>
-  <p:clrMapOvr>
-    <a:masterClrMapping/>
-  </p:clrMapOvr>
-  <mc:AlternateContent xmlns:mc="http://schemas.openxmlformats.org/markup-compatibility/2006" xmlns:p14="http://schemas.microsoft.com/office/powerpoint/2010/main">
-    <mc:Choice Requires="p14">
-      <p:transition spd="med" p14:dur="700">
-        <p:fade/>
-      </p:transition>
-    </mc:Choice>
-    <mc:Fallback xmlns="">
-      <p:transition spd="med">
-        <p:fade/>
-      </p:transition>
-    </mc:Fallback>
-  </mc:AlternateContent>
-  <p:timing>
-    <p:tnLst>
-      <p:par>
-        <p:cTn id="1" dur="indefinite" restart="never" nodeType="tmRoot"/>
-      </p:par>
-    </p:tnLst>
-  </p:timing>
-</p:sld>
-</file>
-
-<file path=ppt/slides/slide2.xml><?xml version="1.0" encoding="utf-8"?>
-<p:sld xmlns:a="http://schemas.openxmlformats.org/drawingml/2006/main" xmlns:r="http://schemas.openxmlformats.org/officeDocument/2006/relationships" xmlns:p="http://schemas.openxmlformats.org/presentationml/2006/main">
-  <p:cSld>
-    <p:spTree>
-      <p:nvGrpSpPr>
-        <p:cNvPr id="1" name=""/>
-        <p:cNvGrpSpPr/>
-        <p:nvPr/>
-      </p:nvGrpSpPr>
-      <p:grpSpPr>
-        <a:xfrm>
-          <a:off x="0" y="0"/>
-          <a:ext cx="0" cy="0"/>
-          <a:chOff x="0" y="0"/>
-          <a:chExt cx="0" cy="0"/>
-        </a:xfrm>
-      </p:grpSpPr>
-      <p:sp>
-        <p:nvSpPr>
-          <p:cNvPr id="13" name="Título 12"/>
-          <p:cNvSpPr>
-            <a:spLocks noGrp="1"/>
-          </p:cNvSpPr>
-          <p:nvPr>
-            <p:ph type="title"/>
-          </p:nvPr>
-        </p:nvSpPr>
-        <p:spPr/>
-        <p:txBody>
-          <a:bodyPr/>
-          <a:lstStyle/>
-          <a:p>
-            <a:r>
-              <a:rPr lang="pt-PT" dirty="0" err="1" smtClean="0"/>
-              <a:t>Indice</a:t>
-            </a:r>
-            <a:endParaRPr lang="pt-PT" dirty="0"/>
-          </a:p>
-        </p:txBody>
-      </p:sp>
-      <p:sp>
-        <p:nvSpPr>
-          <p:cNvPr id="14" name="Marcador de Posição de Conteúdo 13"/>
-          <p:cNvSpPr>
-            <a:spLocks noGrp="1"/>
-          </p:cNvSpPr>
-          <p:nvPr>
-            <p:ph idx="1"/>
-          </p:nvPr>
-        </p:nvSpPr>
-        <p:spPr/>
-        <p:txBody>
-          <a:bodyPr/>
-          <a:lstStyle/>
-          <a:p>
-            <a:r>
-              <a:rPr lang="pt-PT" dirty="0" smtClean="0"/>
-              <a:t>Team</a:t>
-            </a:r>
-          </a:p>
-          <a:p>
-            <a:r>
-              <a:rPr lang="pt-PT" dirty="0" err="1" smtClean="0"/>
-              <a:t>Vision</a:t>
-            </a:r>
-            <a:r>
-              <a:rPr lang="pt-PT" dirty="0" smtClean="0"/>
-              <a:t> </a:t>
-            </a:r>
-            <a:r>
-              <a:rPr lang="pt-PT" dirty="0" err="1" smtClean="0"/>
-              <a:t>and</a:t>
-            </a:r>
-            <a:r>
-              <a:rPr lang="pt-PT" dirty="0" smtClean="0"/>
-              <a:t> Scope</a:t>
-            </a:r>
-            <a:endParaRPr lang="pt-PT" dirty="0" smtClean="0"/>
-          </a:p>
-          <a:p>
-            <a:r>
-              <a:rPr lang="pt-PT" dirty="0" err="1" smtClean="0"/>
-              <a:t>Development</a:t>
-            </a:r>
-            <a:r>
-              <a:rPr lang="pt-PT" dirty="0" smtClean="0"/>
-              <a:t> </a:t>
-            </a:r>
-            <a:r>
-              <a:rPr lang="pt-PT" dirty="0" err="1" smtClean="0"/>
-              <a:t>Plan</a:t>
-            </a:r>
-            <a:endParaRPr lang="pt-PT" dirty="0" smtClean="0"/>
-          </a:p>
-          <a:p>
-            <a:r>
-              <a:rPr lang="pt-PT" dirty="0" err="1" smtClean="0"/>
-              <a:t>Quality</a:t>
-            </a:r>
-            <a:r>
-              <a:rPr lang="pt-PT" dirty="0" smtClean="0"/>
-              <a:t> </a:t>
-            </a:r>
-            <a:r>
-              <a:rPr lang="pt-PT" dirty="0" err="1" smtClean="0"/>
-              <a:t>Plan</a:t>
-            </a:r>
-            <a:endParaRPr lang="pt-PT" dirty="0" smtClean="0"/>
-          </a:p>
-        </p:txBody>
-      </p:sp>
-    </p:spTree>
-    <p:extLst>
-      <p:ext uri="{BB962C8B-B14F-4D97-AF65-F5344CB8AC3E}">
-        <p14:creationId xmlns:p14="http://schemas.microsoft.com/office/powerpoint/2010/main" val="2139132589"/>
       </p:ext>
     </p:extLst>
   </p:cSld>
@@ -7983,6 +8407,101 @@
       </p:grpSpPr>
       <p:sp>
         <p:nvSpPr>
+          <p:cNvPr id="2" name="Título 1"/>
+          <p:cNvSpPr>
+            <a:spLocks noGrp="1"/>
+          </p:cNvSpPr>
+          <p:nvPr>
+            <p:ph type="title"/>
+          </p:nvPr>
+        </p:nvSpPr>
+        <p:spPr/>
+        <p:txBody>
+          <a:bodyPr/>
+          <a:lstStyle/>
+          <a:p>
+            <a:r>
+              <a:rPr lang="pt-PT" dirty="0" smtClean="0"/>
+              <a:t>Team </a:t>
+            </a:r>
+            <a:r>
+              <a:rPr lang="pt-PT" dirty="0" err="1" smtClean="0"/>
+              <a:t>Introduction</a:t>
+            </a:r>
+            <a:endParaRPr lang="pt-PT" dirty="0"/>
+          </a:p>
+        </p:txBody>
+      </p:sp>
+      <p:sp>
+        <p:nvSpPr>
+          <p:cNvPr id="3" name="Marcador de Posição do Texto 2"/>
+          <p:cNvSpPr>
+            <a:spLocks noGrp="1"/>
+          </p:cNvSpPr>
+          <p:nvPr>
+            <p:ph type="body" idx="1"/>
+          </p:nvPr>
+        </p:nvSpPr>
+        <p:spPr/>
+        <p:txBody>
+          <a:bodyPr/>
+          <a:lstStyle/>
+          <a:p>
+            <a:endParaRPr lang="pt-PT" dirty="0"/>
+          </a:p>
+        </p:txBody>
+      </p:sp>
+    </p:spTree>
+    <p:extLst>
+      <p:ext uri="{BB962C8B-B14F-4D97-AF65-F5344CB8AC3E}">
+        <p14:creationId xmlns:p14="http://schemas.microsoft.com/office/powerpoint/2010/main" val="1664616292"/>
+      </p:ext>
+    </p:extLst>
+  </p:cSld>
+  <p:clrMapOvr>
+    <a:masterClrMapping/>
+  </p:clrMapOvr>
+  <mc:AlternateContent xmlns:mc="http://schemas.openxmlformats.org/markup-compatibility/2006" xmlns:p14="http://schemas.microsoft.com/office/powerpoint/2010/main">
+    <mc:Choice Requires="p14">
+      <p:transition spd="med" p14:dur="700">
+        <p:fade/>
+      </p:transition>
+    </mc:Choice>
+    <mc:Fallback xmlns="">
+      <p:transition spd="med">
+        <p:fade/>
+      </p:transition>
+    </mc:Fallback>
+  </mc:AlternateContent>
+  <p:timing>
+    <p:tnLst>
+      <p:par>
+        <p:cTn id="1" dur="indefinite" restart="never" nodeType="tmRoot"/>
+      </p:par>
+    </p:tnLst>
+  </p:timing>
+</p:sld>
+</file>
+
+<file path=ppt/slides/slide4.xml><?xml version="1.0" encoding="utf-8"?>
+<p:sld xmlns:a="http://schemas.openxmlformats.org/drawingml/2006/main" xmlns:r="http://schemas.openxmlformats.org/officeDocument/2006/relationships" xmlns:p="http://schemas.openxmlformats.org/presentationml/2006/main">
+  <p:cSld>
+    <p:spTree>
+      <p:nvGrpSpPr>
+        <p:cNvPr id="1" name=""/>
+        <p:cNvGrpSpPr/>
+        <p:nvPr/>
+      </p:nvGrpSpPr>
+      <p:grpSpPr>
+        <a:xfrm>
+          <a:off x="0" y="0"/>
+          <a:ext cx="0" cy="0"/>
+          <a:chOff x="0" y="0"/>
+          <a:chExt cx="0" cy="0"/>
+        </a:xfrm>
+      </p:grpSpPr>
+      <p:sp>
+        <p:nvSpPr>
           <p:cNvPr id="13" name="Título 12"/>
           <p:cNvSpPr>
             <a:spLocks noGrp="1"/>
@@ -8284,7 +8803,7 @@
 </p:sld>
 </file>
 
-<file path=ppt/slides/slide4.xml><?xml version="1.0" encoding="utf-8"?>
+<file path=ppt/slides/slide5.xml><?xml version="1.0" encoding="utf-8"?>
 <p:sld xmlns:a="http://schemas.openxmlformats.org/drawingml/2006/main" xmlns:r="http://schemas.openxmlformats.org/officeDocument/2006/relationships" xmlns:p="http://schemas.openxmlformats.org/presentationml/2006/main">
   <p:cSld>
     <p:spTree>
@@ -8387,155 +8906,6 @@
 </p:sld>
 </file>
 
-<file path=ppt/slides/slide5.xml><?xml version="1.0" encoding="utf-8"?>
-<p:sld xmlns:a="http://schemas.openxmlformats.org/drawingml/2006/main" xmlns:r="http://schemas.openxmlformats.org/officeDocument/2006/relationships" xmlns:p="http://schemas.openxmlformats.org/presentationml/2006/main">
-  <p:cSld>
-    <p:spTree>
-      <p:nvGrpSpPr>
-        <p:cNvPr id="1" name=""/>
-        <p:cNvGrpSpPr/>
-        <p:nvPr/>
-      </p:nvGrpSpPr>
-      <p:grpSpPr>
-        <a:xfrm>
-          <a:off x="0" y="0"/>
-          <a:ext cx="0" cy="0"/>
-          <a:chOff x="0" y="0"/>
-          <a:chExt cx="0" cy="0"/>
-        </a:xfrm>
-      </p:grpSpPr>
-      <p:sp>
-        <p:nvSpPr>
-          <p:cNvPr id="13" name="Título 12"/>
-          <p:cNvSpPr>
-            <a:spLocks noGrp="1"/>
-          </p:cNvSpPr>
-          <p:nvPr>
-            <p:ph type="title"/>
-          </p:nvPr>
-        </p:nvSpPr>
-        <p:spPr/>
-        <p:txBody>
-          <a:bodyPr/>
-          <a:lstStyle/>
-          <a:p>
-            <a:r>
-              <a:rPr lang="pt-PT" dirty="0" err="1" smtClean="0"/>
-              <a:t>Keep</a:t>
-            </a:r>
-            <a:r>
-              <a:rPr lang="pt-PT" dirty="0" smtClean="0"/>
-              <a:t> </a:t>
-            </a:r>
-            <a:r>
-              <a:rPr lang="pt-PT" dirty="0" err="1" smtClean="0"/>
-              <a:t>Your</a:t>
-            </a:r>
-            <a:r>
-              <a:rPr lang="pt-PT" dirty="0" smtClean="0"/>
-              <a:t> Time</a:t>
-            </a:r>
-            <a:endParaRPr lang="pt-PT" dirty="0"/>
-          </a:p>
-        </p:txBody>
-      </p:sp>
-      <p:sp>
-        <p:nvSpPr>
-          <p:cNvPr id="14" name="Marcador de Posição de Conteúdo 13"/>
-          <p:cNvSpPr>
-            <a:spLocks noGrp="1"/>
-          </p:cNvSpPr>
-          <p:nvPr>
-            <p:ph idx="1"/>
-          </p:nvPr>
-        </p:nvSpPr>
-        <p:spPr/>
-        <p:txBody>
-          <a:bodyPr/>
-          <a:lstStyle/>
-          <a:p>
-            <a:r>
-              <a:rPr lang="en-US" dirty="0"/>
-              <a:t>The time spent in individual tasks is an increasing concern for everyone;</a:t>
-            </a:r>
-          </a:p>
-          <a:p>
-            <a:r>
-              <a:rPr lang="en-US" b="1" dirty="0"/>
-              <a:t>Business</a:t>
-            </a:r>
-            <a:r>
-              <a:rPr lang="en-US" dirty="0"/>
-              <a:t>: </a:t>
-            </a:r>
-          </a:p>
-          <a:p>
-            <a:pPr lvl="1"/>
-            <a:r>
-              <a:rPr lang="en-US" dirty="0"/>
-              <a:t>Costs and deadlines are a major concern;</a:t>
-            </a:r>
-          </a:p>
-          <a:p>
-            <a:pPr lvl="1"/>
-            <a:r>
-              <a:rPr lang="en-US" dirty="0"/>
-              <a:t>The time management doesn’t always receive the required attention or isn’t controlled in an appropriate manner.</a:t>
-            </a:r>
-            <a:endParaRPr lang="en-GB" dirty="0"/>
-          </a:p>
-          <a:p>
-            <a:pPr marL="0" indent="0" algn="ctr">
-              <a:buNone/>
-            </a:pPr>
-            <a:endParaRPr lang="en-GB" sz="3600" dirty="0"/>
-          </a:p>
-          <a:p>
-            <a:pPr marL="0" indent="0" algn="ctr">
-              <a:buNone/>
-            </a:pPr>
-            <a:r>
-              <a:rPr lang="en-GB" sz="3600" dirty="0"/>
-              <a:t>Time Tracking and Task Management System</a:t>
-            </a:r>
-          </a:p>
-          <a:p>
-            <a:endParaRPr lang="pt-PT" dirty="0" smtClean="0"/>
-          </a:p>
-        </p:txBody>
-      </p:sp>
-    </p:spTree>
-    <p:extLst>
-      <p:ext uri="{BB962C8B-B14F-4D97-AF65-F5344CB8AC3E}">
-        <p14:creationId xmlns:p14="http://schemas.microsoft.com/office/powerpoint/2010/main" val="1174630951"/>
-      </p:ext>
-    </p:extLst>
-  </p:cSld>
-  <p:clrMapOvr>
-    <a:masterClrMapping/>
-  </p:clrMapOvr>
-  <mc:AlternateContent xmlns:mc="http://schemas.openxmlformats.org/markup-compatibility/2006">
-    <mc:Choice xmlns:p14="http://schemas.microsoft.com/office/powerpoint/2010/main" Requires="p14">
-      <p:transition spd="med" p14:dur="700">
-        <p:fade/>
-      </p:transition>
-    </mc:Choice>
-    <mc:Fallback>
-      <p:transition spd="med">
-        <p:fade/>
-      </p:transition>
-    </mc:Fallback>
-  </mc:AlternateContent>
-  <p:timing>
-    <p:tnLst>
-      <p:par>
-        <p:cTn id="1" dur="indefinite" restart="never" nodeType="tmRoot"/>
-      </p:par>
-    </p:tnLst>
-  </p:timing>
-</p:sld>
-</file>
-
 <file path=ppt/slides/slide6.xml><?xml version="1.0" encoding="utf-8"?>
 <p:sld xmlns:a="http://schemas.openxmlformats.org/drawingml/2006/main" xmlns:r="http://schemas.openxmlformats.org/officeDocument/2006/relationships" xmlns:p="http://schemas.openxmlformats.org/presentationml/2006/main">
   <p:cSld>
@@ -8570,7 +8940,19 @@
           <a:p>
             <a:r>
               <a:rPr lang="pt-PT" dirty="0" err="1" smtClean="0"/>
-              <a:t>Objectives</a:t>
+              <a:t>Keep</a:t>
+            </a:r>
+            <a:r>
+              <a:rPr lang="pt-PT" dirty="0" smtClean="0"/>
+              <a:t> </a:t>
+            </a:r>
+            <a:r>
+              <a:rPr lang="pt-PT" dirty="0" err="1" smtClean="0"/>
+              <a:t>Your</a:t>
+            </a:r>
+            <a:r>
+              <a:rPr lang="pt-PT" dirty="0" smtClean="0"/>
+              <a:t> Time</a:t>
             </a:r>
             <a:endParaRPr lang="pt-PT" dirty="0"/>
           </a:p>
@@ -8591,48 +8973,52 @@
           <a:bodyPr/>
           <a:lstStyle/>
           <a:p>
+            <a:r>
+              <a:rPr lang="en-US" dirty="0"/>
+              <a:t>The time spent in individual tasks is an increasing concern for everyone;</a:t>
+            </a:r>
+          </a:p>
+          <a:p>
+            <a:r>
+              <a:rPr lang="en-US" b="1" dirty="0"/>
+              <a:t>Business</a:t>
+            </a:r>
+            <a:r>
+              <a:rPr lang="en-US" dirty="0"/>
+              <a:t>: </a:t>
+            </a:r>
+          </a:p>
+          <a:p>
+            <a:pPr lvl="1"/>
+            <a:r>
+              <a:rPr lang="en-US" dirty="0"/>
+              <a:t>Costs and deadlines are a major concern;</a:t>
+            </a:r>
+          </a:p>
+          <a:p>
+            <a:pPr lvl="1"/>
+            <a:r>
+              <a:rPr lang="en-US" dirty="0"/>
+              <a:t>The time management doesn’t always receive the required attention or isn’t controlled in an appropriate manner.</a:t>
+            </a:r>
+            <a:endParaRPr lang="en-GB" dirty="0"/>
+          </a:p>
+          <a:p>
             <a:pPr marL="0" indent="0" algn="ctr">
               <a:buNone/>
             </a:pPr>
-            <a:endParaRPr lang="en-US" dirty="0" smtClean="0"/>
+            <a:endParaRPr lang="en-GB" sz="3600" dirty="0"/>
           </a:p>
           <a:p>
             <a:pPr marL="0" indent="0" algn="ctr">
               <a:buNone/>
             </a:pPr>
-            <a:endParaRPr lang="en-US" dirty="0"/>
-          </a:p>
-          <a:p>
-            <a:pPr marL="0" indent="0" algn="ctr">
-              <a:buNone/>
-            </a:pPr>
-            <a:r>
-              <a:rPr lang="en-US" dirty="0" smtClean="0"/>
-              <a:t>Increase </a:t>
-            </a:r>
-            <a:r>
-              <a:rPr lang="en-US" dirty="0"/>
-              <a:t>people’s efficiency and performance;</a:t>
-            </a:r>
-          </a:p>
-          <a:p>
-            <a:pPr algn="ctr"/>
-            <a:endParaRPr lang="en-US" dirty="0"/>
-          </a:p>
-          <a:p>
-            <a:pPr marL="0" indent="0" algn="ctr">
-              <a:buNone/>
-            </a:pPr>
-            <a:r>
-              <a:rPr lang="en-US" dirty="0"/>
-              <a:t>Assist a person to focus on a certain task;</a:t>
-            </a:r>
-            <a:endParaRPr lang="pt-PT" dirty="0"/>
-          </a:p>
-          <a:p>
-            <a:pPr marL="0" indent="0">
-              <a:buNone/>
-            </a:pPr>
+            <a:r>
+              <a:rPr lang="en-GB" sz="3600" dirty="0"/>
+              <a:t>Time Tracking and Task Management System</a:t>
+            </a:r>
+          </a:p>
+          <a:p>
             <a:endParaRPr lang="pt-PT" dirty="0" smtClean="0"/>
           </a:p>
         </p:txBody>
@@ -8640,7 +9026,7 @@
     </p:spTree>
     <p:extLst>
       <p:ext uri="{BB962C8B-B14F-4D97-AF65-F5344CB8AC3E}">
-        <p14:creationId xmlns:p14="http://schemas.microsoft.com/office/powerpoint/2010/main" val="2668676028"/>
+        <p14:creationId xmlns:p14="http://schemas.microsoft.com/office/powerpoint/2010/main" val="1174630951"/>
       </p:ext>
     </p:extLst>
   </p:cSld>
@@ -8702,6 +9088,139 @@
           <a:lstStyle/>
           <a:p>
             <a:r>
+              <a:rPr lang="pt-PT" dirty="0" err="1" smtClean="0"/>
+              <a:t>Objectives</a:t>
+            </a:r>
+            <a:endParaRPr lang="pt-PT" dirty="0"/>
+          </a:p>
+        </p:txBody>
+      </p:sp>
+      <p:sp>
+        <p:nvSpPr>
+          <p:cNvPr id="14" name="Marcador de Posição de Conteúdo 13"/>
+          <p:cNvSpPr>
+            <a:spLocks noGrp="1"/>
+          </p:cNvSpPr>
+          <p:nvPr>
+            <p:ph idx="1"/>
+          </p:nvPr>
+        </p:nvSpPr>
+        <p:spPr/>
+        <p:txBody>
+          <a:bodyPr/>
+          <a:lstStyle/>
+          <a:p>
+            <a:pPr marL="0" indent="0" algn="ctr">
+              <a:buNone/>
+            </a:pPr>
+            <a:endParaRPr lang="en-US" dirty="0" smtClean="0"/>
+          </a:p>
+          <a:p>
+            <a:pPr marL="0" indent="0" algn="ctr">
+              <a:buNone/>
+            </a:pPr>
+            <a:endParaRPr lang="en-US" dirty="0"/>
+          </a:p>
+          <a:p>
+            <a:pPr marL="0" indent="0" algn="ctr">
+              <a:buNone/>
+            </a:pPr>
+            <a:r>
+              <a:rPr lang="en-US" dirty="0" smtClean="0"/>
+              <a:t>Increase </a:t>
+            </a:r>
+            <a:r>
+              <a:rPr lang="en-US" dirty="0"/>
+              <a:t>people’s efficiency and performance;</a:t>
+            </a:r>
+          </a:p>
+          <a:p>
+            <a:pPr algn="ctr"/>
+            <a:endParaRPr lang="en-US" dirty="0"/>
+          </a:p>
+          <a:p>
+            <a:pPr marL="0" indent="0" algn="ctr">
+              <a:buNone/>
+            </a:pPr>
+            <a:r>
+              <a:rPr lang="en-US" dirty="0"/>
+              <a:t>Assist a person to focus on a certain task;</a:t>
+            </a:r>
+            <a:endParaRPr lang="pt-PT" dirty="0"/>
+          </a:p>
+          <a:p>
+            <a:pPr marL="0" indent="0">
+              <a:buNone/>
+            </a:pPr>
+            <a:endParaRPr lang="pt-PT" dirty="0" smtClean="0"/>
+          </a:p>
+        </p:txBody>
+      </p:sp>
+    </p:spTree>
+    <p:extLst>
+      <p:ext uri="{BB962C8B-B14F-4D97-AF65-F5344CB8AC3E}">
+        <p14:creationId xmlns:p14="http://schemas.microsoft.com/office/powerpoint/2010/main" val="2668676028"/>
+      </p:ext>
+    </p:extLst>
+  </p:cSld>
+  <p:clrMapOvr>
+    <a:masterClrMapping/>
+  </p:clrMapOvr>
+  <mc:AlternateContent xmlns:mc="http://schemas.openxmlformats.org/markup-compatibility/2006">
+    <mc:Choice xmlns:p14="http://schemas.microsoft.com/office/powerpoint/2010/main" Requires="p14">
+      <p:transition spd="med" p14:dur="700">
+        <p:fade/>
+      </p:transition>
+    </mc:Choice>
+    <mc:Fallback>
+      <p:transition spd="med">
+        <p:fade/>
+      </p:transition>
+    </mc:Fallback>
+  </mc:AlternateContent>
+  <p:timing>
+    <p:tnLst>
+      <p:par>
+        <p:cTn id="1" dur="indefinite" restart="never" nodeType="tmRoot"/>
+      </p:par>
+    </p:tnLst>
+  </p:timing>
+</p:sld>
+</file>
+
+<file path=ppt/slides/slide8.xml><?xml version="1.0" encoding="utf-8"?>
+<p:sld xmlns:a="http://schemas.openxmlformats.org/drawingml/2006/main" xmlns:r="http://schemas.openxmlformats.org/officeDocument/2006/relationships" xmlns:p="http://schemas.openxmlformats.org/presentationml/2006/main">
+  <p:cSld>
+    <p:spTree>
+      <p:nvGrpSpPr>
+        <p:cNvPr id="1" name=""/>
+        <p:cNvGrpSpPr/>
+        <p:nvPr/>
+      </p:nvGrpSpPr>
+      <p:grpSpPr>
+        <a:xfrm>
+          <a:off x="0" y="0"/>
+          <a:ext cx="0" cy="0"/>
+          <a:chOff x="0" y="0"/>
+          <a:chExt cx="0" cy="0"/>
+        </a:xfrm>
+      </p:grpSpPr>
+      <p:sp>
+        <p:nvSpPr>
+          <p:cNvPr id="13" name="Título 12"/>
+          <p:cNvSpPr>
+            <a:spLocks noGrp="1"/>
+          </p:cNvSpPr>
+          <p:nvPr>
+            <p:ph type="title"/>
+          </p:nvPr>
+        </p:nvSpPr>
+        <p:spPr/>
+        <p:txBody>
+          <a:bodyPr/>
+          <a:lstStyle/>
+          <a:p>
+            <a:r>
               <a:rPr lang="pt-PT" dirty="0" smtClean="0"/>
               <a:t>Business </a:t>
             </a:r>
@@ -8799,7 +9318,7 @@
 </p:sld>
 </file>
 
-<file path=ppt/slides/slide8.xml><?xml version="1.0" encoding="utf-8"?>
+<file path=ppt/slides/slide9.xml><?xml version="1.0" encoding="utf-8"?>
 <p:sld xmlns:a="http://schemas.openxmlformats.org/drawingml/2006/main" xmlns:r="http://schemas.openxmlformats.org/officeDocument/2006/relationships" xmlns:p="http://schemas.openxmlformats.org/presentationml/2006/main">
   <p:cSld>
     <p:spTree>
@@ -9976,173 +10495,6 @@
       <p:bldP spid="10" grpId="0"/>
       <p:bldP spid="11" grpId="0"/>
     </p:bldLst>
-  </p:timing>
-</p:sld>
-</file>
-
-<file path=ppt/slides/slide9.xml><?xml version="1.0" encoding="utf-8"?>
-<p:sld xmlns:a="http://schemas.openxmlformats.org/drawingml/2006/main" xmlns:r="http://schemas.openxmlformats.org/officeDocument/2006/relationships" xmlns:p="http://schemas.openxmlformats.org/presentationml/2006/main">
-  <p:cSld>
-    <p:spTree>
-      <p:nvGrpSpPr>
-        <p:cNvPr id="1" name=""/>
-        <p:cNvGrpSpPr/>
-        <p:nvPr/>
-      </p:nvGrpSpPr>
-      <p:grpSpPr>
-        <a:xfrm>
-          <a:off x="0" y="0"/>
-          <a:ext cx="0" cy="0"/>
-          <a:chOff x="0" y="0"/>
-          <a:chExt cx="0" cy="0"/>
-        </a:xfrm>
-      </p:grpSpPr>
-      <p:sp>
-        <p:nvSpPr>
-          <p:cNvPr id="13" name="Título 12"/>
-          <p:cNvSpPr>
-            <a:spLocks noGrp="1"/>
-          </p:cNvSpPr>
-          <p:nvPr>
-            <p:ph type="title"/>
-          </p:nvPr>
-        </p:nvSpPr>
-        <p:spPr/>
-        <p:txBody>
-          <a:bodyPr/>
-          <a:lstStyle/>
-          <a:p>
-            <a:r>
-              <a:rPr lang="pt-PT" dirty="0" smtClean="0"/>
-              <a:t>Software</a:t>
-            </a:r>
-            <a:endParaRPr lang="pt-PT" dirty="0"/>
-          </a:p>
-        </p:txBody>
-      </p:sp>
-      <p:sp>
-        <p:nvSpPr>
-          <p:cNvPr id="14" name="Marcador de Posição de Conteúdo 13"/>
-          <p:cNvSpPr>
-            <a:spLocks noGrp="1"/>
-          </p:cNvSpPr>
-          <p:nvPr>
-            <p:ph idx="1"/>
-          </p:nvPr>
-        </p:nvSpPr>
-        <p:spPr/>
-        <p:txBody>
-          <a:bodyPr>
-            <a:normAutofit/>
-          </a:bodyPr>
-          <a:lstStyle/>
-          <a:p>
-            <a:r>
-              <a:rPr lang="en-GB" b="1" dirty="0" smtClean="0"/>
-              <a:t>Assumptions</a:t>
-            </a:r>
-            <a:r>
-              <a:rPr lang="en-GB" b="1" dirty="0"/>
-              <a:t>:</a:t>
-            </a:r>
-          </a:p>
-          <a:p>
-            <a:pPr lvl="1"/>
-            <a:endParaRPr lang="en-GB" b="1" dirty="0"/>
-          </a:p>
-          <a:p>
-            <a:pPr lvl="1"/>
-            <a:r>
-              <a:rPr lang="en-GB" dirty="0"/>
-              <a:t>The computer will have:</a:t>
-            </a:r>
-          </a:p>
-          <a:p>
-            <a:pPr lvl="2"/>
-            <a:r>
-              <a:rPr lang="en-GB" dirty="0"/>
-              <a:t>Windows OS (least the Vista version);</a:t>
-            </a:r>
-          </a:p>
-          <a:p>
-            <a:pPr lvl="2"/>
-            <a:r>
-              <a:rPr lang="en-GB" dirty="0"/>
-              <a:t>Framework .NET 4.5;</a:t>
-            </a:r>
-          </a:p>
-          <a:p>
-            <a:pPr lvl="2"/>
-            <a:endParaRPr lang="en-GB" dirty="0"/>
-          </a:p>
-          <a:p>
-            <a:pPr lvl="1"/>
-            <a:r>
-              <a:rPr lang="en-GB" dirty="0"/>
-              <a:t>The Smartphone will have:</a:t>
-            </a:r>
-          </a:p>
-          <a:p>
-            <a:pPr lvl="2"/>
-            <a:r>
-              <a:rPr lang="en-GB" dirty="0"/>
-              <a:t>An Android platform;</a:t>
-            </a:r>
-          </a:p>
-          <a:p>
-            <a:pPr lvl="2"/>
-            <a:r>
-              <a:rPr lang="en-GB" dirty="0"/>
-              <a:t>Wireless technology.</a:t>
-            </a:r>
-          </a:p>
-          <a:p>
-            <a:pPr lvl="2"/>
-            <a:endParaRPr lang="en-GB" dirty="0"/>
-          </a:p>
-          <a:p>
-            <a:pPr lvl="1"/>
-            <a:r>
-              <a:rPr lang="en-GB" dirty="0"/>
-              <a:t>The computer and the smartphone must be connected to the same network</a:t>
-            </a:r>
-          </a:p>
-          <a:p>
-            <a:pPr marL="0" indent="0">
-              <a:buNone/>
-            </a:pPr>
-            <a:endParaRPr lang="pt-PT" dirty="0" smtClean="0"/>
-          </a:p>
-        </p:txBody>
-      </p:sp>
-    </p:spTree>
-    <p:extLst>
-      <p:ext uri="{BB962C8B-B14F-4D97-AF65-F5344CB8AC3E}">
-        <p14:creationId xmlns:p14="http://schemas.microsoft.com/office/powerpoint/2010/main" val="4051420759"/>
-      </p:ext>
-    </p:extLst>
-  </p:cSld>
-  <p:clrMapOvr>
-    <a:masterClrMapping/>
-  </p:clrMapOvr>
-  <mc:AlternateContent xmlns:mc="http://schemas.openxmlformats.org/markup-compatibility/2006">
-    <mc:Choice xmlns:p14="http://schemas.microsoft.com/office/powerpoint/2010/main" Requires="p14">
-      <p:transition spd="med" p14:dur="700">
-        <p:fade/>
-      </p:transition>
-    </mc:Choice>
-    <mc:Fallback>
-      <p:transition spd="med">
-        <p:fade/>
-      </p:transition>
-    </mc:Fallback>
-  </mc:AlternateContent>
-  <p:timing>
-    <p:tnLst>
-      <p:par>
-        <p:cTn id="1" dur="indefinite" restart="never" nodeType="tmRoot"/>
-      </p:par>
-    </p:tnLst>
   </p:timing>
 </p:sld>
 </file>

</xml_diff>

<commit_message>
Small updates to KOM.pptx
</commit_message>
<xml_diff>
--- a/Docs/Project documentation/KOM.pptx
+++ b/Docs/Project documentation/KOM.pptx
@@ -135,7 +135,7 @@
   </p:defaultTextStyle>
   <p:extLst>
     <p:ext uri="{EFAFB233-063F-42B5-8137-9DF3F51BA10A}">
-      <p15:sldGuideLst xmlns:p15="http://schemas.microsoft.com/office/powerpoint/2012/main" xmlns="">
+      <p15:sldGuideLst xmlns:p15="http://schemas.microsoft.com/office/powerpoint/2012/main">
         <p15:guide id="1" orient="horz" pos="2160">
           <p15:clr>
             <a:srgbClr val="A4A3A4"/>
@@ -239,7 +239,7 @@
       </p15:sldGuideLst>
     </p:ext>
     <p:ext uri="{2D200454-40CA-4A62-9FC3-DE9A4176ACB9}">
-      <p15:notesGuideLst xmlns:p15="http://schemas.microsoft.com/office/powerpoint/2012/main" xmlns=""/>
+      <p15:notesGuideLst xmlns:p15="http://schemas.microsoft.com/office/powerpoint/2012/main"/>
     </p:ext>
   </p:extLst>
 </p:presentation>
@@ -281,15 +281,85 @@
             </c:strRef>
           </c:tx>
           <c:spPr>
-            <a:solidFill>
-              <a:schemeClr val="accent1"/>
-            </a:solidFill>
+            <a:pattFill prst="narHorz">
+              <a:fgClr>
+                <a:schemeClr val="accent1"/>
+              </a:fgClr>
+              <a:bgClr>
+                <a:schemeClr val="accent1">
+                  <a:lumMod val="20000"/>
+                  <a:lumOff val="80000"/>
+                </a:schemeClr>
+              </a:bgClr>
+            </a:pattFill>
             <a:ln>
               <a:noFill/>
             </a:ln>
-            <a:effectLst/>
+            <a:effectLst>
+              <a:innerShdw blurRad="114300">
+                <a:schemeClr val="accent1"/>
+              </a:innerShdw>
+            </a:effectLst>
           </c:spPr>
           <c:invertIfNegative val="0"/>
+          <c:dLbls>
+            <c:spPr>
+              <a:noFill/>
+              <a:ln>
+                <a:noFill/>
+              </a:ln>
+              <a:effectLst/>
+            </c:spPr>
+            <c:txPr>
+              <a:bodyPr rot="0" spcFirstLastPara="1" vertOverflow="ellipsis" vert="horz" wrap="square" lIns="38100" tIns="19050" rIns="38100" bIns="19050" anchor="ctr" anchorCtr="1">
+                <a:spAutoFit/>
+              </a:bodyPr>
+              <a:lstStyle/>
+              <a:p>
+                <a:pPr>
+                  <a:defRPr sz="1197" b="0" i="0" u="none" strike="noStrike" kern="1200" baseline="0">
+                    <a:solidFill>
+                      <a:schemeClr val="tx1">
+                        <a:lumMod val="75000"/>
+                        <a:lumOff val="25000"/>
+                      </a:schemeClr>
+                    </a:solidFill>
+                    <a:latin typeface="+mn-lt"/>
+                    <a:ea typeface="+mn-ea"/>
+                    <a:cs typeface="+mn-cs"/>
+                  </a:defRPr>
+                </a:pPr>
+                <a:endParaRPr lang="pt-PT"/>
+              </a:p>
+            </c:txPr>
+            <c:dLblPos val="outEnd"/>
+            <c:showLegendKey val="0"/>
+            <c:showVal val="1"/>
+            <c:showCatName val="0"/>
+            <c:showSerName val="0"/>
+            <c:showPercent val="0"/>
+            <c:showBubbleSize val="0"/>
+            <c:showLeaderLines val="0"/>
+            <c:extLst>
+              <c:ext xmlns:c15="http://schemas.microsoft.com/office/drawing/2012/chart" uri="{CE6537A1-D6FC-4f65-9D91-7224C49458BB}">
+                <c15:layout/>
+                <c15:showLeaderLines val="1"/>
+                <c15:leaderLines>
+                  <c:spPr>
+                    <a:ln w="9525">
+                      <a:solidFill>
+                        <a:schemeClr val="tx1">
+                          <a:lumMod val="35000"/>
+                          <a:lumOff val="65000"/>
+                        </a:schemeClr>
+                      </a:solidFill>
+                    </a:ln>
+                    <a:effectLst/>
+                  </c:spPr>
+                </c15:leaderLines>
+              </c:ext>
+            </c:extLst>
+          </c:dLbls>
           <c:cat>
             <c:strRef>
               <c:f>Sheet1!$A$2:$A$4</c:f>
@@ -327,20 +397,21 @@
           </c:val>
         </c:ser>
         <c:dLbls>
+          <c:dLblPos val="outEnd"/>
           <c:showLegendKey val="0"/>
-          <c:showVal val="0"/>
+          <c:showVal val="1"/>
           <c:showCatName val="0"/>
           <c:showSerName val="0"/>
           <c:showPercent val="0"/>
           <c:showBubbleSize val="0"/>
         </c:dLbls>
-        <c:gapWidth val="219"/>
-        <c:overlap val="-27"/>
-        <c:axId val="37229056"/>
-        <c:axId val="69694528"/>
+        <c:gapWidth val="164"/>
+        <c:overlap val="-22"/>
+        <c:axId val="256662144"/>
+        <c:axId val="256662704"/>
       </c:barChart>
       <c:catAx>
-        <c:axId val="37229056"/>
+        <c:axId val="256662144"/>
         <c:scaling>
           <c:orientation val="minMax"/>
         </c:scaling>
@@ -352,11 +423,11 @@
         <c:tickLblPos val="nextTo"/>
         <c:spPr>
           <a:noFill/>
-          <a:ln w="9525" cap="flat" cmpd="sng" algn="ctr">
+          <a:ln w="19050" cap="flat" cmpd="sng" algn="ctr">
             <a:solidFill>
               <a:schemeClr val="tx1">
-                <a:lumMod val="15000"/>
-                <a:lumOff val="85000"/>
+                <a:lumMod val="25000"/>
+                <a:lumOff val="75000"/>
               </a:schemeClr>
             </a:solidFill>
             <a:round/>
@@ -383,7 +454,7 @@
             <a:endParaRPr lang="pt-PT"/>
           </a:p>
         </c:txPr>
-        <c:crossAx val="69694528"/>
+        <c:crossAx val="256662704"/>
         <c:crosses val="autoZero"/>
         <c:auto val="1"/>
         <c:lblAlgn val="ctr"/>
@@ -391,7 +462,7 @@
         <c:noMultiLvlLbl val="0"/>
       </c:catAx>
       <c:valAx>
-        <c:axId val="69694528"/>
+        <c:axId val="256662704"/>
         <c:scaling>
           <c:orientation val="minMax"/>
         </c:scaling>
@@ -428,7 +499,7 @@
             <a:endParaRPr lang="pt-PT"/>
           </a:p>
         </c:txPr>
-        <c:crossAx val="37229056"/>
+        <c:crossAx val="256662144"/>
         <c:crosses val="autoZero"/>
         <c:crossBetween val="between"/>
       </c:valAx>
@@ -441,7 +512,7 @@
       </c:spPr>
     </c:plotArea>
     <c:legend>
-      <c:legendPos val="b"/>
+      <c:legendPos val="t"/>
       <c:layout/>
       <c:overlay val="0"/>
       <c:spPr>
@@ -493,7 +564,7 @@
       <a:endParaRPr lang="pt-PT"/>
     </a:p>
   </c:txPr>
-  <c:externalData r:id="rId1">
+  <c:externalData r:id="rId3">
     <c:autoUpdate val="0"/>
   </c:externalData>
 </c:chartSpace>
@@ -535,15 +606,89 @@
             </c:strRef>
           </c:tx>
           <c:spPr>
-            <a:solidFill>
-              <a:schemeClr val="accent1"/>
-            </a:solidFill>
+            <a:gradFill rotWithShape="1">
+              <a:gsLst>
+                <a:gs pos="0">
+                  <a:schemeClr val="accent1">
+                    <a:satMod val="103000"/>
+                    <a:lumMod val="118000"/>
+                  </a:schemeClr>
+                </a:gs>
+                <a:gs pos="50000">
+                  <a:schemeClr val="accent1">
+                    <a:satMod val="89000"/>
+                    <a:lumMod val="91000"/>
+                  </a:schemeClr>
+                </a:gs>
+                <a:gs pos="100000">
+                  <a:schemeClr val="accent1">
+                    <a:lumMod val="69000"/>
+                  </a:schemeClr>
+                </a:gs>
+              </a:gsLst>
+              <a:lin ang="5400000" scaled="0"/>
+            </a:gradFill>
             <a:ln>
               <a:noFill/>
             </a:ln>
             <a:effectLst/>
           </c:spPr>
           <c:invertIfNegative val="0"/>
+          <c:dLbls>
+            <c:spPr>
+              <a:noFill/>
+              <a:ln>
+                <a:noFill/>
+              </a:ln>
+              <a:effectLst/>
+            </c:spPr>
+            <c:txPr>
+              <a:bodyPr rot="0" spcFirstLastPara="1" vertOverflow="ellipsis" vert="horz" wrap="square" lIns="38100" tIns="19050" rIns="38100" bIns="19050" anchor="ctr" anchorCtr="1">
+                <a:spAutoFit/>
+              </a:bodyPr>
+              <a:lstStyle/>
+              <a:p>
+                <a:pPr>
+                  <a:defRPr sz="1197" b="0" i="0" u="none" strike="noStrike" kern="1200" baseline="0">
+                    <a:solidFill>
+                      <a:schemeClr val="tx2"/>
+                    </a:solidFill>
+                    <a:latin typeface="+mn-lt"/>
+                    <a:ea typeface="+mn-ea"/>
+                    <a:cs typeface="+mn-cs"/>
+                  </a:defRPr>
+                </a:pPr>
+                <a:endParaRPr lang="pt-PT"/>
+              </a:p>
+            </c:txPr>
+            <c:dLblPos val="outEnd"/>
+            <c:showLegendKey val="0"/>
+            <c:showVal val="1"/>
+            <c:showCatName val="0"/>
+            <c:showSerName val="0"/>
+            <c:showPercent val="0"/>
+            <c:showBubbleSize val="0"/>
+            <c:showLeaderLines val="0"/>
+            <c:extLst>
+              <c:ext xmlns:c15="http://schemas.microsoft.com/office/drawing/2012/chart" uri="{CE6537A1-D6FC-4f65-9D91-7224C49458BB}">
+                <c15:layout/>
+                <c15:showLeaderLines val="1"/>
+                <c15:leaderLines>
+                  <c:spPr>
+                    <a:ln w="9525">
+                      <a:solidFill>
+                        <a:schemeClr val="tx2">
+                          <a:lumMod val="35000"/>
+                          <a:lumOff val="65000"/>
+                        </a:schemeClr>
+                      </a:solidFill>
+                    </a:ln>
+                    <a:effectLst/>
+                  </c:spPr>
+                </c15:leaderLines>
+              </c:ext>
+            </c:extLst>
+          </c:dLbls>
           <c:cat>
             <c:strRef>
               <c:f>Sheet1!$A$2:$A$8</c:f>
@@ -605,20 +750,21 @@
           </c:val>
         </c:ser>
         <c:dLbls>
+          <c:dLblPos val="outEnd"/>
           <c:showLegendKey val="0"/>
-          <c:showVal val="0"/>
+          <c:showVal val="1"/>
           <c:showCatName val="0"/>
           <c:showSerName val="0"/>
           <c:showPercent val="0"/>
           <c:showBubbleSize val="0"/>
         </c:dLbls>
-        <c:gapWidth val="219"/>
-        <c:overlap val="-27"/>
-        <c:axId val="37229568"/>
-        <c:axId val="100922432"/>
+        <c:gapWidth val="100"/>
+        <c:overlap val="-24"/>
+        <c:axId val="256664944"/>
+        <c:axId val="254843312"/>
       </c:barChart>
       <c:catAx>
-        <c:axId val="37229568"/>
+        <c:axId val="256664944"/>
         <c:scaling>
           <c:orientation val="minMax"/>
         </c:scaling>
@@ -632,7 +778,7 @@
           <a:noFill/>
           <a:ln w="9525" cap="flat" cmpd="sng" algn="ctr">
             <a:solidFill>
-              <a:schemeClr val="tx1">
+              <a:schemeClr val="tx2">
                 <a:lumMod val="15000"/>
                 <a:lumOff val="85000"/>
               </a:schemeClr>
@@ -648,10 +794,7 @@
             <a:pPr>
               <a:defRPr sz="1197" b="0" i="0" u="none" strike="noStrike" kern="1200" baseline="0">
                 <a:solidFill>
-                  <a:schemeClr val="tx1">
-                    <a:lumMod val="65000"/>
-                    <a:lumOff val="35000"/>
-                  </a:schemeClr>
+                  <a:schemeClr val="tx2"/>
                 </a:solidFill>
                 <a:latin typeface="+mn-lt"/>
                 <a:ea typeface="+mn-ea"/>
@@ -661,7 +804,7 @@
             <a:endParaRPr lang="pt-PT"/>
           </a:p>
         </c:txPr>
-        <c:crossAx val="100922432"/>
+        <c:crossAx val="254843312"/>
         <c:crosses val="autoZero"/>
         <c:auto val="1"/>
         <c:lblAlgn val="ctr"/>
@@ -669,12 +812,26 @@
         <c:noMultiLvlLbl val="0"/>
       </c:catAx>
       <c:valAx>
-        <c:axId val="100922432"/>
+        <c:axId val="254843312"/>
         <c:scaling>
           <c:orientation val="minMax"/>
         </c:scaling>
         <c:delete val="0"/>
         <c:axPos val="l"/>
+        <c:majorGridlines>
+          <c:spPr>
+            <a:ln w="9525" cap="flat" cmpd="sng" algn="ctr">
+              <a:solidFill>
+                <a:schemeClr val="tx2">
+                  <a:lumMod val="15000"/>
+                  <a:lumOff val="85000"/>
+                </a:schemeClr>
+              </a:solidFill>
+              <a:round/>
+            </a:ln>
+            <a:effectLst/>
+          </c:spPr>
+        </c:majorGridlines>
         <c:numFmt formatCode="General" sourceLinked="1"/>
         <c:majorTickMark val="none"/>
         <c:minorTickMark val="none"/>
@@ -693,10 +850,7 @@
             <a:pPr>
               <a:defRPr sz="1197" b="0" i="0" u="none" strike="noStrike" kern="1200" baseline="0">
                 <a:solidFill>
-                  <a:schemeClr val="tx1">
-                    <a:lumMod val="65000"/>
-                    <a:lumOff val="35000"/>
-                  </a:schemeClr>
+                  <a:schemeClr val="tx2"/>
                 </a:solidFill>
                 <a:latin typeface="+mn-lt"/>
                 <a:ea typeface="+mn-ea"/>
@@ -706,7 +860,7 @@
             <a:endParaRPr lang="pt-PT"/>
           </a:p>
         </c:txPr>
-        <c:crossAx val="37229568"/>
+        <c:crossAx val="256664944"/>
         <c:crosses val="autoZero"/>
         <c:crossBetween val="between"/>
       </c:valAx>
@@ -736,10 +890,7 @@
           <a:pPr>
             <a:defRPr sz="1197" b="0" i="0" u="none" strike="noStrike" kern="1200" baseline="0">
               <a:solidFill>
-                <a:schemeClr val="tx1">
-                  <a:lumMod val="65000"/>
-                  <a:lumOff val="35000"/>
-                </a:schemeClr>
+                <a:schemeClr val="tx2"/>
               </a:solidFill>
               <a:latin typeface="+mn-lt"/>
               <a:ea typeface="+mn-ea"/>
@@ -771,7 +922,7 @@
       <a:endParaRPr lang="pt-PT"/>
     </a:p>
   </c:txPr>
-  <c:externalData r:id="rId1">
+  <c:externalData r:id="rId3">
     <c:autoUpdate val="0"/>
   </c:externalData>
 </c:chartSpace>
@@ -858,7 +1009,7 @@
 </file>
 
 <file path=ppt/charts/style1.xml><?xml version="1.0" encoding="utf-8"?>
-<cs:chartStyle xmlns:cs="http://schemas.microsoft.com/office/drawing/2012/chartStyle" xmlns:a="http://schemas.openxmlformats.org/drawingml/2006/main" id="201">
+<cs:chartStyle xmlns:cs="http://schemas.microsoft.com/office/drawing/2012/chartStyle" xmlns:a="http://schemas.openxmlformats.org/drawingml/2006/main" id="203">
   <cs:axisTitle>
     <cs:lnRef idx="0"/>
     <cs:fillRef idx="0"/>
@@ -869,7 +1020,7 @@
         <a:lumOff val="35000"/>
       </a:schemeClr>
     </cs:fontRef>
-    <cs:defRPr sz="1330" kern="1200"/>
+    <cs:defRPr sz="1197" b="1" kern="1200"/>
   </cs:axisTitle>
   <cs:categoryAxis>
     <cs:lnRef idx="0"/>
@@ -882,11 +1033,11 @@
       </a:schemeClr>
     </cs:fontRef>
     <cs:spPr>
-      <a:ln w="9525" cap="flat" cmpd="sng" algn="ctr">
+      <a:ln w="19050" cap="flat" cmpd="sng" algn="ctr">
         <a:solidFill>
           <a:schemeClr val="tx1">
-            <a:lumMod val="15000"/>
-            <a:lumOff val="85000"/>
+            <a:lumMod val="25000"/>
+            <a:lumOff val="75000"/>
           </a:schemeClr>
         </a:solidFill>
         <a:round/>
@@ -899,7 +1050,7 @@
     <cs:fillRef idx="0"/>
     <cs:effectRef idx="0"/>
     <cs:fontRef idx="minor">
-      <a:schemeClr val="tx1"/>
+      <a:schemeClr val="dk1"/>
     </cs:fontRef>
     <cs:spPr>
       <a:solidFill>
@@ -915,7 +1066,7 @@
         <a:round/>
       </a:ln>
     </cs:spPr>
-    <cs:defRPr sz="1330" kern="1200"/>
+    <cs:defRPr sz="1197" kern="1200"/>
   </cs:chartArea>
   <cs:dataLabel>
     <cs:lnRef idx="0"/>
@@ -953,35 +1104,76 @@
       </a:ln>
     </cs:spPr>
     <cs:defRPr sz="1197" kern="1200"/>
+    <cs:bodyPr rot="0" spcFirstLastPara="1" vertOverflow="clip" horzOverflow="clip" vert="horz" wrap="square" lIns="36576" tIns="18288" rIns="36576" bIns="18288" anchor="ctr" anchorCtr="1">
+      <a:spAutoFit/>
+    </cs:bodyPr>
   </cs:dataLabelCallout>
   <cs:dataPoint>
     <cs:lnRef idx="0"/>
-    <cs:fillRef idx="1">
+    <cs:fillRef idx="0">
+      <cs:styleClr val="auto"/>
+    </cs:fillRef>
+    <cs:effectRef idx="0">
+      <cs:styleClr val="auto"/>
+    </cs:effectRef>
+    <cs:fontRef idx="minor">
+      <a:schemeClr val="dk1"/>
+    </cs:fontRef>
+    <cs:spPr>
+      <a:pattFill prst="narHorz">
+        <a:fgClr>
+          <a:schemeClr val="phClr"/>
+        </a:fgClr>
+        <a:bgClr>
+          <a:schemeClr val="phClr">
+            <a:lumMod val="20000"/>
+            <a:lumOff val="80000"/>
+          </a:schemeClr>
+        </a:bgClr>
+      </a:pattFill>
+      <a:effectLst>
+        <a:innerShdw blurRad="114300">
+          <a:schemeClr val="phClr"/>
+        </a:innerShdw>
+      </a:effectLst>
+    </cs:spPr>
+  </cs:dataPoint>
+  <cs:dataPoint3D>
+    <cs:lnRef idx="0"/>
+    <cs:fillRef idx="0">
       <cs:styleClr val="auto"/>
     </cs:fillRef>
     <cs:effectRef idx="0"/>
     <cs:fontRef idx="minor">
-      <a:schemeClr val="tx1"/>
+      <a:schemeClr val="dk1"/>
     </cs:fontRef>
-  </cs:dataPoint>
-  <cs:dataPoint3D>
-    <cs:lnRef idx="0"/>
-    <cs:fillRef idx="1">
-      <cs:styleClr val="auto"/>
-    </cs:fillRef>
-    <cs:effectRef idx="0"/>
-    <cs:fontRef idx="minor">
-      <a:schemeClr val="tx1"/>
-    </cs:fontRef>
+    <cs:spPr>
+      <a:pattFill prst="narHorz">
+        <a:fgClr>
+          <a:schemeClr val="phClr"/>
+        </a:fgClr>
+        <a:bgClr>
+          <a:schemeClr val="phClr">
+            <a:lumMod val="20000"/>
+            <a:lumOff val="80000"/>
+          </a:schemeClr>
+        </a:bgClr>
+      </a:pattFill>
+      <a:effectLst>
+        <a:innerShdw blurRad="114300">
+          <a:schemeClr val="phClr"/>
+        </a:innerShdw>
+      </a:effectLst>
+    </cs:spPr>
   </cs:dataPoint3D>
   <cs:dataPointLine>
     <cs:lnRef idx="0">
       <cs:styleClr val="auto"/>
     </cs:lnRef>
-    <cs:fillRef idx="1"/>
+    <cs:fillRef idx="0"/>
     <cs:effectRef idx="0"/>
     <cs:fontRef idx="minor">
-      <a:schemeClr val="tx1"/>
+      <a:schemeClr val="dk1"/>
     </cs:fontRef>
     <cs:spPr>
       <a:ln w="28575" cap="rnd">
@@ -993,33 +1185,29 @@
     </cs:spPr>
   </cs:dataPointLine>
   <cs:dataPointMarker>
-    <cs:lnRef idx="0">
-      <cs:styleClr val="auto"/>
-    </cs:lnRef>
-    <cs:fillRef idx="1">
+    <cs:lnRef idx="0"/>
+    <cs:fillRef idx="0">
       <cs:styleClr val="auto"/>
     </cs:fillRef>
     <cs:effectRef idx="0"/>
     <cs:fontRef idx="minor">
-      <a:schemeClr val="tx1"/>
+      <a:schemeClr val="dk1"/>
     </cs:fontRef>
     <cs:spPr>
-      <a:ln w="9525">
-        <a:solidFill>
-          <a:schemeClr val="phClr"/>
-        </a:solidFill>
-      </a:ln>
+      <a:solidFill>
+        <a:schemeClr val="phClr"/>
+      </a:solidFill>
     </cs:spPr>
   </cs:dataPointMarker>
-  <cs:dataPointMarkerLayout symbol="circle" size="5"/>
+  <cs:dataPointMarkerLayout symbol="circle" size="6"/>
   <cs:dataPointWireframe>
     <cs:lnRef idx="0">
       <cs:styleClr val="auto"/>
     </cs:lnRef>
-    <cs:fillRef idx="1"/>
+    <cs:fillRef idx="0"/>
     <cs:effectRef idx="0"/>
     <cs:fontRef idx="minor">
-      <a:schemeClr val="tx1"/>
+      <a:schemeClr val="dk1"/>
     </cs:fontRef>
     <cs:spPr>
       <a:ln w="9525" cap="rnd">
@@ -1041,15 +1229,484 @@
       </a:schemeClr>
     </cs:fontRef>
     <cs:spPr>
-      <a:noFill/>
-      <a:ln w="9525" cap="flat" cmpd="sng" algn="ctr">
+      <a:ln w="9525">
         <a:solidFill>
           <a:schemeClr val="tx1">
             <a:lumMod val="15000"/>
             <a:lumOff val="85000"/>
           </a:schemeClr>
         </a:solidFill>
+      </a:ln>
+    </cs:spPr>
+    <cs:defRPr sz="1197" kern="1200"/>
+  </cs:dataTable>
+  <cs:downBar>
+    <cs:lnRef idx="0"/>
+    <cs:fillRef idx="0"/>
+    <cs:effectRef idx="0"/>
+    <cs:fontRef idx="minor">
+      <a:schemeClr val="dk1"/>
+    </cs:fontRef>
+    <cs:spPr>
+      <a:solidFill>
+        <a:schemeClr val="dk1">
+          <a:lumMod val="75000"/>
+          <a:lumOff val="25000"/>
+        </a:schemeClr>
+      </a:solidFill>
+      <a:ln w="9525">
+        <a:solidFill>
+          <a:schemeClr val="tx1">
+            <a:lumMod val="50000"/>
+            <a:lumOff val="50000"/>
+          </a:schemeClr>
+        </a:solidFill>
+      </a:ln>
+    </cs:spPr>
+  </cs:downBar>
+  <cs:dropLine>
+    <cs:lnRef idx="0"/>
+    <cs:fillRef idx="0"/>
+    <cs:effectRef idx="0"/>
+    <cs:fontRef idx="minor">
+      <a:schemeClr val="dk1"/>
+    </cs:fontRef>
+    <cs:spPr>
+      <a:ln w="9525">
+        <a:solidFill>
+          <a:schemeClr val="tx1">
+            <a:lumMod val="35000"/>
+            <a:lumOff val="65000"/>
+          </a:schemeClr>
+        </a:solidFill>
         <a:round/>
+      </a:ln>
+    </cs:spPr>
+  </cs:dropLine>
+  <cs:errorBar>
+    <cs:lnRef idx="0"/>
+    <cs:fillRef idx="0"/>
+    <cs:effectRef idx="0"/>
+    <cs:fontRef idx="minor">
+      <a:schemeClr val="dk1"/>
+    </cs:fontRef>
+    <cs:spPr>
+      <a:ln w="9525">
+        <a:solidFill>
+          <a:schemeClr val="tx1">
+            <a:lumMod val="50000"/>
+            <a:lumOff val="50000"/>
+          </a:schemeClr>
+        </a:solidFill>
+        <a:round/>
+      </a:ln>
+    </cs:spPr>
+  </cs:errorBar>
+  <cs:floor>
+    <cs:lnRef idx="0"/>
+    <cs:fillRef idx="0"/>
+    <cs:effectRef idx="0"/>
+    <cs:fontRef idx="minor">
+      <a:schemeClr val="dk1"/>
+    </cs:fontRef>
+  </cs:floor>
+  <cs:gridlineMajor>
+    <cs:lnRef idx="0"/>
+    <cs:fillRef idx="0"/>
+    <cs:effectRef idx="0"/>
+    <cs:fontRef idx="minor">
+      <a:schemeClr val="dk1"/>
+    </cs:fontRef>
+    <cs:spPr>
+      <a:ln>
+        <a:solidFill>
+          <a:schemeClr val="tx1">
+            <a:lumMod val="15000"/>
+            <a:lumOff val="85000"/>
+          </a:schemeClr>
+        </a:solidFill>
+      </a:ln>
+    </cs:spPr>
+  </cs:gridlineMajor>
+  <cs:gridlineMinor>
+    <cs:lnRef idx="0"/>
+    <cs:fillRef idx="0"/>
+    <cs:effectRef idx="0"/>
+    <cs:fontRef idx="minor">
+      <a:schemeClr val="dk1"/>
+    </cs:fontRef>
+    <cs:spPr>
+      <a:ln>
+        <a:solidFill>
+          <a:schemeClr val="tx1">
+            <a:lumMod val="5000"/>
+            <a:lumOff val="95000"/>
+          </a:schemeClr>
+        </a:solidFill>
+      </a:ln>
+    </cs:spPr>
+  </cs:gridlineMinor>
+  <cs:hiLoLine>
+    <cs:lnRef idx="0"/>
+    <cs:fillRef idx="0"/>
+    <cs:effectRef idx="0"/>
+    <cs:fontRef idx="minor">
+      <a:schemeClr val="dk1"/>
+    </cs:fontRef>
+    <cs:spPr>
+      <a:ln w="9525">
+        <a:solidFill>
+          <a:schemeClr val="tx1">
+            <a:lumMod val="35000"/>
+            <a:lumOff val="65000"/>
+          </a:schemeClr>
+        </a:solidFill>
+        <a:round/>
+      </a:ln>
+    </cs:spPr>
+  </cs:hiLoLine>
+  <cs:leaderLine>
+    <cs:lnRef idx="0"/>
+    <cs:fillRef idx="0"/>
+    <cs:effectRef idx="0"/>
+    <cs:fontRef idx="minor">
+      <a:schemeClr val="dk1"/>
+    </cs:fontRef>
+    <cs:spPr>
+      <a:ln w="9525">
+        <a:solidFill>
+          <a:schemeClr val="tx1">
+            <a:lumMod val="35000"/>
+            <a:lumOff val="65000"/>
+          </a:schemeClr>
+        </a:solidFill>
+      </a:ln>
+    </cs:spPr>
+  </cs:leaderLine>
+  <cs:legend>
+    <cs:lnRef idx="0"/>
+    <cs:fillRef idx="0"/>
+    <cs:effectRef idx="0"/>
+    <cs:fontRef idx="minor">
+      <a:schemeClr val="tx1">
+        <a:lumMod val="65000"/>
+        <a:lumOff val="35000"/>
+      </a:schemeClr>
+    </cs:fontRef>
+    <cs:defRPr sz="1197" kern="1200"/>
+  </cs:legend>
+  <cs:plotArea mods="allowNoFillOverride allowNoLineOverride">
+    <cs:lnRef idx="0"/>
+    <cs:fillRef idx="0"/>
+    <cs:effectRef idx="0"/>
+    <cs:fontRef idx="minor">
+      <a:schemeClr val="dk1"/>
+    </cs:fontRef>
+  </cs:plotArea>
+  <cs:plotArea3D mods="allowNoFillOverride allowNoLineOverride">
+    <cs:lnRef idx="0"/>
+    <cs:fillRef idx="0"/>
+    <cs:effectRef idx="0"/>
+    <cs:fontRef idx="minor">
+      <a:schemeClr val="dk1"/>
+    </cs:fontRef>
+  </cs:plotArea3D>
+  <cs:seriesAxis>
+    <cs:lnRef idx="0"/>
+    <cs:fillRef idx="0"/>
+    <cs:effectRef idx="0"/>
+    <cs:fontRef idx="minor">
+      <a:schemeClr val="tx1">
+        <a:lumMod val="65000"/>
+        <a:lumOff val="35000"/>
+      </a:schemeClr>
+    </cs:fontRef>
+    <cs:defRPr sz="1197" kern="1200"/>
+  </cs:seriesAxis>
+  <cs:seriesLine>
+    <cs:lnRef idx="0"/>
+    <cs:fillRef idx="0"/>
+    <cs:effectRef idx="0"/>
+    <cs:fontRef idx="minor">
+      <a:schemeClr val="dk1"/>
+    </cs:fontRef>
+    <cs:spPr>
+      <a:ln w="9525">
+        <a:solidFill>
+          <a:schemeClr val="tx1">
+            <a:lumMod val="35000"/>
+            <a:lumOff val="65000"/>
+          </a:schemeClr>
+        </a:solidFill>
+        <a:round/>
+      </a:ln>
+    </cs:spPr>
+  </cs:seriesLine>
+  <cs:title>
+    <cs:lnRef idx="0"/>
+    <cs:fillRef idx="0"/>
+    <cs:effectRef idx="0"/>
+    <cs:fontRef idx="minor">
+      <a:schemeClr val="tx1">
+        <a:lumMod val="50000"/>
+        <a:lumOff val="50000"/>
+      </a:schemeClr>
+    </cs:fontRef>
+    <cs:defRPr sz="2200" b="1" kern="1200" cap="all" spc="150" baseline="0"/>
+  </cs:title>
+  <cs:trendline>
+    <cs:lnRef idx="0">
+      <cs:styleClr val="auto"/>
+    </cs:lnRef>
+    <cs:fillRef idx="0"/>
+    <cs:effectRef idx="0"/>
+    <cs:fontRef idx="minor">
+      <a:schemeClr val="dk1"/>
+    </cs:fontRef>
+    <cs:spPr>
+      <a:ln w="19050" cap="rnd">
+        <a:solidFill>
+          <a:schemeClr val="phClr"/>
+        </a:solidFill>
+      </a:ln>
+    </cs:spPr>
+  </cs:trendline>
+  <cs:trendlineLabel>
+    <cs:lnRef idx="0"/>
+    <cs:fillRef idx="0"/>
+    <cs:effectRef idx="0"/>
+    <cs:fontRef idx="minor">
+      <a:schemeClr val="tx1">
+        <a:lumMod val="65000"/>
+        <a:lumOff val="35000"/>
+      </a:schemeClr>
+    </cs:fontRef>
+    <cs:defRPr sz="1197" kern="1200"/>
+  </cs:trendlineLabel>
+  <cs:upBar>
+    <cs:lnRef idx="0"/>
+    <cs:fillRef idx="0"/>
+    <cs:effectRef idx="0"/>
+    <cs:fontRef idx="minor">
+      <a:schemeClr val="dk1"/>
+    </cs:fontRef>
+    <cs:spPr>
+      <a:solidFill>
+        <a:schemeClr val="lt1"/>
+      </a:solidFill>
+      <a:ln w="9525">
+        <a:solidFill>
+          <a:schemeClr val="tx1">
+            <a:lumMod val="50000"/>
+            <a:lumOff val="50000"/>
+          </a:schemeClr>
+        </a:solidFill>
+      </a:ln>
+    </cs:spPr>
+  </cs:upBar>
+  <cs:valueAxis>
+    <cs:lnRef idx="0"/>
+    <cs:fillRef idx="0"/>
+    <cs:effectRef idx="0"/>
+    <cs:fontRef idx="minor">
+      <a:schemeClr val="tx1">
+        <a:lumMod val="65000"/>
+        <a:lumOff val="35000"/>
+      </a:schemeClr>
+    </cs:fontRef>
+    <cs:defRPr sz="1197" kern="1200"/>
+  </cs:valueAxis>
+  <cs:wall>
+    <cs:lnRef idx="0"/>
+    <cs:fillRef idx="0"/>
+    <cs:effectRef idx="0"/>
+    <cs:fontRef idx="minor">
+      <a:schemeClr val="dk1"/>
+    </cs:fontRef>
+  </cs:wall>
+</cs:chartStyle>
+</file>
+
+<file path=ppt/charts/style2.xml><?xml version="1.0" encoding="utf-8"?>
+<cs:chartStyle xmlns:cs="http://schemas.microsoft.com/office/drawing/2012/chartStyle" xmlns:a="http://schemas.openxmlformats.org/drawingml/2006/main" id="207">
+  <cs:axisTitle>
+    <cs:lnRef idx="0"/>
+    <cs:fillRef idx="0"/>
+    <cs:effectRef idx="0"/>
+    <cs:fontRef idx="minor">
+      <a:schemeClr val="tx2"/>
+    </cs:fontRef>
+    <cs:defRPr sz="1197" b="1" kern="1200"/>
+  </cs:axisTitle>
+  <cs:categoryAxis>
+    <cs:lnRef idx="0"/>
+    <cs:fillRef idx="0"/>
+    <cs:effectRef idx="0"/>
+    <cs:fontRef idx="minor">
+      <a:schemeClr val="tx2"/>
+    </cs:fontRef>
+    <cs:spPr>
+      <a:ln w="9525" cap="flat" cmpd="sng" algn="ctr">
+        <a:solidFill>
+          <a:schemeClr val="tx2">
+            <a:lumMod val="15000"/>
+            <a:lumOff val="85000"/>
+          </a:schemeClr>
+        </a:solidFill>
+        <a:round/>
+      </a:ln>
+    </cs:spPr>
+    <cs:defRPr sz="1197" kern="1200"/>
+  </cs:categoryAxis>
+  <cs:chartArea mods="allowNoFillOverride allowNoLineOverride">
+    <cs:lnRef idx="0"/>
+    <cs:fillRef idx="0"/>
+    <cs:effectRef idx="0"/>
+    <cs:fontRef idx="minor">
+      <a:schemeClr val="tx2"/>
+    </cs:fontRef>
+    <cs:spPr>
+      <a:solidFill>
+        <a:schemeClr val="bg1"/>
+      </a:solidFill>
+      <a:ln w="9525" cap="flat" cmpd="sng" algn="ctr">
+        <a:solidFill>
+          <a:schemeClr val="tx2">
+            <a:lumMod val="15000"/>
+            <a:lumOff val="85000"/>
+          </a:schemeClr>
+        </a:solidFill>
+        <a:round/>
+      </a:ln>
+    </cs:spPr>
+    <cs:defRPr sz="1197" kern="1200"/>
+  </cs:chartArea>
+  <cs:dataLabel>
+    <cs:lnRef idx="0"/>
+    <cs:fillRef idx="0"/>
+    <cs:effectRef idx="0"/>
+    <cs:fontRef idx="minor">
+      <a:schemeClr val="tx2"/>
+    </cs:fontRef>
+    <cs:defRPr sz="1197" kern="1200"/>
+  </cs:dataLabel>
+  <cs:dataLabelCallout>
+    <cs:lnRef idx="0"/>
+    <cs:fillRef idx="0"/>
+    <cs:effectRef idx="0"/>
+    <cs:fontRef idx="minor">
+      <a:schemeClr val="dk2">
+        <a:lumMod val="75000"/>
+      </a:schemeClr>
+    </cs:fontRef>
+    <cs:spPr>
+      <a:solidFill>
+        <a:schemeClr val="lt1"/>
+      </a:solidFill>
+      <a:ln>
+        <a:solidFill>
+          <a:schemeClr val="dk1">
+            <a:lumMod val="25000"/>
+            <a:lumOff val="75000"/>
+          </a:schemeClr>
+        </a:solidFill>
+      </a:ln>
+    </cs:spPr>
+    <cs:defRPr sz="1197" kern="1200"/>
+    <cs:bodyPr rot="0" spcFirstLastPara="1" vertOverflow="clip" horzOverflow="clip" vert="horz" wrap="square" lIns="36576" tIns="18288" rIns="36576" bIns="18288" anchor="ctr" anchorCtr="1">
+      <a:spAutoFit/>
+    </cs:bodyPr>
+  </cs:dataLabelCallout>
+  <cs:dataPoint>
+    <cs:lnRef idx="0"/>
+    <cs:fillRef idx="3">
+      <cs:styleClr val="auto"/>
+    </cs:fillRef>
+    <cs:effectRef idx="2"/>
+    <cs:fontRef idx="minor">
+      <a:schemeClr val="tx2"/>
+    </cs:fontRef>
+  </cs:dataPoint>
+  <cs:dataPoint3D>
+    <cs:lnRef idx="0"/>
+    <cs:fillRef idx="3">
+      <cs:styleClr val="auto"/>
+    </cs:fillRef>
+    <cs:effectRef idx="2"/>
+    <cs:fontRef idx="minor">
+      <a:schemeClr val="tx2"/>
+    </cs:fontRef>
+  </cs:dataPoint3D>
+  <cs:dataPointLine>
+    <cs:lnRef idx="0">
+      <cs:styleClr val="auto"/>
+    </cs:lnRef>
+    <cs:fillRef idx="3"/>
+    <cs:effectRef idx="2"/>
+    <cs:fontRef idx="minor">
+      <a:schemeClr val="tx2"/>
+    </cs:fontRef>
+    <cs:spPr>
+      <a:ln w="31750" cap="rnd">
+        <a:solidFill>
+          <a:schemeClr val="phClr"/>
+        </a:solidFill>
+        <a:round/>
+      </a:ln>
+    </cs:spPr>
+  </cs:dataPointLine>
+  <cs:dataPointMarker>
+    <cs:lnRef idx="0"/>
+    <cs:fillRef idx="3">
+      <cs:styleClr val="auto"/>
+    </cs:fillRef>
+    <cs:effectRef idx="2"/>
+    <cs:fontRef idx="minor">
+      <a:schemeClr val="tx2"/>
+    </cs:fontRef>
+    <cs:spPr>
+      <a:ln w="12700">
+        <a:solidFill>
+          <a:schemeClr val="lt2"/>
+        </a:solidFill>
+        <a:round/>
+      </a:ln>
+    </cs:spPr>
+  </cs:dataPointMarker>
+  <cs:dataPointMarkerLayout symbol="circle" size="6"/>
+  <cs:dataPointWireframe>
+    <cs:lnRef idx="0">
+      <cs:styleClr val="auto"/>
+    </cs:lnRef>
+    <cs:fillRef idx="3"/>
+    <cs:effectRef idx="2"/>
+    <cs:fontRef idx="minor">
+      <a:schemeClr val="tx2"/>
+    </cs:fontRef>
+    <cs:spPr>
+      <a:ln w="9525" cap="rnd">
+        <a:solidFill>
+          <a:schemeClr val="phClr"/>
+        </a:solidFill>
+        <a:round/>
+      </a:ln>
+    </cs:spPr>
+  </cs:dataPointWireframe>
+  <cs:dataTable>
+    <cs:lnRef idx="0"/>
+    <cs:fillRef idx="0"/>
+    <cs:effectRef idx="0"/>
+    <cs:fontRef idx="minor">
+      <a:schemeClr val="tx2"/>
+    </cs:fontRef>
+    <cs:spPr>
+      <a:ln w="9525">
+        <a:solidFill>
+          <a:schemeClr val="tx2">
+            <a:lumMod val="15000"/>
+            <a:lumOff val="85000"/>
+          </a:schemeClr>
+        </a:solidFill>
       </a:ln>
     </cs:spPr>
     <cs:defRPr sz="1197" kern="1200"/>
@@ -1083,17 +1740,17 @@
     <cs:fillRef idx="0"/>
     <cs:effectRef idx="0"/>
     <cs:fontRef idx="minor">
-      <a:schemeClr val="tx1"/>
+      <a:schemeClr val="tx2"/>
     </cs:fontRef>
     <cs:spPr>
-      <a:ln w="9525" cap="flat" cmpd="sng" algn="ctr">
+      <a:ln w="9525">
         <a:solidFill>
-          <a:schemeClr val="tx1">
-            <a:lumMod val="35000"/>
-            <a:lumOff val="65000"/>
+          <a:schemeClr val="tx2">
+            <a:lumMod val="60000"/>
+            <a:lumOff val="40000"/>
           </a:schemeClr>
         </a:solidFill>
-        <a:round/>
+        <a:prstDash val="dash"/>
       </a:ln>
     </cs:spPr>
   </cs:dropLine>
@@ -1102,14 +1759,14 @@
     <cs:fillRef idx="0"/>
     <cs:effectRef idx="0"/>
     <cs:fontRef idx="minor">
-      <a:schemeClr val="tx1"/>
+      <a:schemeClr val="tx2"/>
     </cs:fontRef>
     <cs:spPr>
-      <a:ln w="9525" cap="flat" cmpd="sng" algn="ctr">
+      <a:ln w="9525">
         <a:solidFill>
-          <a:schemeClr val="tx1">
-            <a:lumMod val="65000"/>
-            <a:lumOff val="35000"/>
+          <a:schemeClr val="tx2">
+            <a:lumMod val="75000"/>
+            <a:lumOff val="25000"/>
           </a:schemeClr>
         </a:solidFill>
         <a:round/>
@@ -1121,26 +1778,20 @@
     <cs:fillRef idx="0"/>
     <cs:effectRef idx="0"/>
     <cs:fontRef idx="minor">
-      <a:schemeClr val="tx1"/>
+      <a:schemeClr val="tx2"/>
     </cs:fontRef>
-    <cs:spPr>
-      <a:noFill/>
-      <a:ln>
-        <a:noFill/>
-      </a:ln>
-    </cs:spPr>
   </cs:floor>
   <cs:gridlineMajor>
     <cs:lnRef idx="0"/>
     <cs:fillRef idx="0"/>
     <cs:effectRef idx="0"/>
     <cs:fontRef idx="minor">
-      <a:schemeClr val="tx1"/>
+      <a:schemeClr val="tx2"/>
     </cs:fontRef>
     <cs:spPr>
       <a:ln w="9525" cap="flat" cmpd="sng" algn="ctr">
         <a:solidFill>
-          <a:schemeClr val="tx1">
+          <a:schemeClr val="tx2">
             <a:lumMod val="15000"/>
             <a:lumOff val="85000"/>
           </a:schemeClr>
@@ -1154,17 +1805,16 @@
     <cs:fillRef idx="0"/>
     <cs:effectRef idx="0"/>
     <cs:fontRef idx="minor">
-      <a:schemeClr val="tx1"/>
+      <a:schemeClr val="tx2"/>
     </cs:fontRef>
     <cs:spPr>
-      <a:ln w="9525" cap="flat" cmpd="sng" algn="ctr">
+      <a:ln>
         <a:solidFill>
-          <a:schemeClr val="tx1">
+          <a:schemeClr val="tx2">
             <a:lumMod val="5000"/>
             <a:lumOff val="95000"/>
           </a:schemeClr>
         </a:solidFill>
-        <a:round/>
       </a:ln>
     </cs:spPr>
   </cs:gridlineMinor>
@@ -1173,17 +1823,17 @@
     <cs:fillRef idx="0"/>
     <cs:effectRef idx="0"/>
     <cs:fontRef idx="minor">
-      <a:schemeClr val="tx1"/>
+      <a:schemeClr val="tx2"/>
     </cs:fontRef>
     <cs:spPr>
-      <a:ln w="9525" cap="flat" cmpd="sng" algn="ctr">
+      <a:ln w="9525">
         <a:solidFill>
-          <a:schemeClr val="tx1">
-            <a:lumMod val="75000"/>
-            <a:lumOff val="25000"/>
+          <a:schemeClr val="tx2">
+            <a:lumMod val="60000"/>
+            <a:lumOff val="40000"/>
           </a:schemeClr>
         </a:solidFill>
-        <a:round/>
+        <a:prstDash val="dash"/>
       </a:ln>
     </cs:spPr>
   </cs:hiLoLine>
@@ -1192,17 +1842,16 @@
     <cs:fillRef idx="0"/>
     <cs:effectRef idx="0"/>
     <cs:fontRef idx="minor">
-      <a:schemeClr val="tx1"/>
+      <a:schemeClr val="tx2"/>
     </cs:fontRef>
     <cs:spPr>
-      <a:ln w="9525" cap="flat" cmpd="sng" algn="ctr">
+      <a:ln w="9525">
         <a:solidFill>
-          <a:schemeClr val="tx1">
+          <a:schemeClr val="tx2">
             <a:lumMod val="35000"/>
             <a:lumOff val="65000"/>
           </a:schemeClr>
         </a:solidFill>
-        <a:round/>
       </a:ln>
     </cs:spPr>
   </cs:leaderLine>
@@ -1211,27 +1860,24 @@
     <cs:fillRef idx="0"/>
     <cs:effectRef idx="0"/>
     <cs:fontRef idx="minor">
-      <a:schemeClr val="tx1">
-        <a:lumMod val="65000"/>
-        <a:lumOff val="35000"/>
-      </a:schemeClr>
+      <a:schemeClr val="tx2"/>
     </cs:fontRef>
     <cs:defRPr sz="1197" kern="1200"/>
   </cs:legend>
-  <cs:plotArea mods="allowNoFillOverride allowNoLineOverride">
+  <cs:plotArea>
     <cs:lnRef idx="0"/>
     <cs:fillRef idx="0"/>
     <cs:effectRef idx="0"/>
     <cs:fontRef idx="minor">
-      <a:schemeClr val="tx1"/>
+      <a:schemeClr val="tx2"/>
     </cs:fontRef>
   </cs:plotArea>
-  <cs:plotArea3D mods="allowNoFillOverride allowNoLineOverride">
+  <cs:plotArea3D>
     <cs:lnRef idx="0"/>
     <cs:fillRef idx="0"/>
     <cs:effectRef idx="0"/>
     <cs:fontRef idx="minor">
-      <a:schemeClr val="tx1"/>
+      <a:schemeClr val="tx2"/>
     </cs:fontRef>
   </cs:plotArea3D>
   <cs:seriesAxis>
@@ -1239,11 +1885,19 @@
     <cs:fillRef idx="0"/>
     <cs:effectRef idx="0"/>
     <cs:fontRef idx="minor">
-      <a:schemeClr val="tx1">
-        <a:lumMod val="65000"/>
-        <a:lumOff val="35000"/>
-      </a:schemeClr>
+      <a:schemeClr val="tx2"/>
     </cs:fontRef>
+    <cs:spPr>
+      <a:ln w="9525" cap="flat" cmpd="sng" algn="ctr">
+        <a:solidFill>
+          <a:schemeClr val="tx2">
+            <a:lumMod val="15000"/>
+            <a:lumOff val="85000"/>
+          </a:schemeClr>
+        </a:solidFill>
+        <a:round/>
+      </a:ln>
+    </cs:spPr>
     <cs:defRPr sz="1197" kern="1200"/>
   </cs:seriesAxis>
   <cs:seriesLine>
@@ -1251,17 +1905,17 @@
     <cs:fillRef idx="0"/>
     <cs:effectRef idx="0"/>
     <cs:fontRef idx="minor">
-      <a:schemeClr val="tx1"/>
+      <a:schemeClr val="tx2"/>
     </cs:fontRef>
     <cs:spPr>
-      <a:ln w="9525" cap="flat" cmpd="sng" algn="ctr">
+      <a:ln w="9525">
         <a:solidFill>
-          <a:schemeClr val="tx1">
-            <a:lumMod val="35000"/>
-            <a:lumOff val="65000"/>
+          <a:schemeClr val="tx2">
+            <a:lumMod val="60000"/>
+            <a:lumOff val="40000"/>
           </a:schemeClr>
         </a:solidFill>
-        <a:round/>
+        <a:prstDash val="dash"/>
       </a:ln>
     </cs:spPr>
   </cs:seriesLine>
@@ -1270,12 +1924,9 @@
     <cs:fillRef idx="0"/>
     <cs:effectRef idx="0"/>
     <cs:fontRef idx="minor">
-      <a:schemeClr val="tx1">
-        <a:lumMod val="65000"/>
-        <a:lumOff val="35000"/>
-      </a:schemeClr>
+      <a:schemeClr val="tx2"/>
     </cs:fontRef>
-    <cs:defRPr sz="1862" b="0" kern="1200" spc="0" baseline="0"/>
+    <cs:defRPr sz="2128" b="1" kern="1200"/>
   </cs:title>
   <cs:trendline>
     <cs:lnRef idx="0">
@@ -1284,14 +1935,14 @@
     <cs:fillRef idx="0"/>
     <cs:effectRef idx="0"/>
     <cs:fontRef idx="minor">
-      <a:schemeClr val="tx1"/>
+      <a:schemeClr val="tx2"/>
     </cs:fontRef>
     <cs:spPr>
       <a:ln w="19050" cap="rnd">
         <a:solidFill>
           <a:schemeClr val="phClr"/>
         </a:solidFill>
-        <a:prstDash val="sysDot"/>
+        <a:prstDash val="sysDash"/>
       </a:ln>
     </cs:spPr>
   </cs:trendline>
@@ -1300,10 +1951,7 @@
     <cs:fillRef idx="0"/>
     <cs:effectRef idx="0"/>
     <cs:fontRef idx="minor">
-      <a:schemeClr val="tx1">
-        <a:lumMod val="65000"/>
-        <a:lumOff val="35000"/>
-      </a:schemeClr>
+      <a:schemeClr val="tx2"/>
     </cs:fontRef>
     <cs:defRPr sz="1197" kern="1200"/>
   </cs:trendlineLabel>
@@ -1312,7 +1960,7 @@
     <cs:fillRef idx="0"/>
     <cs:effectRef idx="0"/>
     <cs:fontRef idx="minor">
-      <a:schemeClr val="dk1"/>
+      <a:schemeClr val="tx2"/>
     </cs:fontRef>
     <cs:spPr>
       <a:solidFill>
@@ -1333,10 +1981,7 @@
     <cs:fillRef idx="0"/>
     <cs:effectRef idx="0"/>
     <cs:fontRef idx="minor">
-      <a:schemeClr val="tx1">
-        <a:lumMod val="65000"/>
-        <a:lumOff val="35000"/>
-      </a:schemeClr>
+      <a:schemeClr val="tx2"/>
     </cs:fontRef>
     <cs:defRPr sz="1197" kern="1200"/>
   </cs:valueAxis>
@@ -1345,514 +1990,8 @@
     <cs:fillRef idx="0"/>
     <cs:effectRef idx="0"/>
     <cs:fontRef idx="minor">
-      <a:schemeClr val="tx1"/>
+      <a:schemeClr val="tx2"/>
     </cs:fontRef>
-    <cs:spPr>
-      <a:noFill/>
-      <a:ln>
-        <a:noFill/>
-      </a:ln>
-    </cs:spPr>
-  </cs:wall>
-</cs:chartStyle>
-</file>
-
-<file path=ppt/charts/style2.xml><?xml version="1.0" encoding="utf-8"?>
-<cs:chartStyle xmlns:cs="http://schemas.microsoft.com/office/drawing/2012/chartStyle" xmlns:a="http://schemas.openxmlformats.org/drawingml/2006/main" id="201">
-  <cs:axisTitle>
-    <cs:lnRef idx="0"/>
-    <cs:fillRef idx="0"/>
-    <cs:effectRef idx="0"/>
-    <cs:fontRef idx="minor">
-      <a:schemeClr val="tx1">
-        <a:lumMod val="65000"/>
-        <a:lumOff val="35000"/>
-      </a:schemeClr>
-    </cs:fontRef>
-    <cs:defRPr sz="1330" kern="1200"/>
-  </cs:axisTitle>
-  <cs:categoryAxis>
-    <cs:lnRef idx="0"/>
-    <cs:fillRef idx="0"/>
-    <cs:effectRef idx="0"/>
-    <cs:fontRef idx="minor">
-      <a:schemeClr val="tx1">
-        <a:lumMod val="65000"/>
-        <a:lumOff val="35000"/>
-      </a:schemeClr>
-    </cs:fontRef>
-    <cs:spPr>
-      <a:ln w="9525" cap="flat" cmpd="sng" algn="ctr">
-        <a:solidFill>
-          <a:schemeClr val="tx1">
-            <a:lumMod val="15000"/>
-            <a:lumOff val="85000"/>
-          </a:schemeClr>
-        </a:solidFill>
-        <a:round/>
-      </a:ln>
-    </cs:spPr>
-    <cs:defRPr sz="1197" kern="1200"/>
-  </cs:categoryAxis>
-  <cs:chartArea mods="allowNoFillOverride allowNoLineOverride">
-    <cs:lnRef idx="0"/>
-    <cs:fillRef idx="0"/>
-    <cs:effectRef idx="0"/>
-    <cs:fontRef idx="minor">
-      <a:schemeClr val="tx1"/>
-    </cs:fontRef>
-    <cs:spPr>
-      <a:solidFill>
-        <a:schemeClr val="bg1"/>
-      </a:solidFill>
-      <a:ln w="9525" cap="flat" cmpd="sng" algn="ctr">
-        <a:solidFill>
-          <a:schemeClr val="tx1">
-            <a:lumMod val="15000"/>
-            <a:lumOff val="85000"/>
-          </a:schemeClr>
-        </a:solidFill>
-        <a:round/>
-      </a:ln>
-    </cs:spPr>
-    <cs:defRPr sz="1330" kern="1200"/>
-  </cs:chartArea>
-  <cs:dataLabel>
-    <cs:lnRef idx="0"/>
-    <cs:fillRef idx="0"/>
-    <cs:effectRef idx="0"/>
-    <cs:fontRef idx="minor">
-      <a:schemeClr val="tx1">
-        <a:lumMod val="75000"/>
-        <a:lumOff val="25000"/>
-      </a:schemeClr>
-    </cs:fontRef>
-    <cs:defRPr sz="1197" kern="1200"/>
-  </cs:dataLabel>
-  <cs:dataLabelCallout>
-    <cs:lnRef idx="0"/>
-    <cs:fillRef idx="0"/>
-    <cs:effectRef idx="0"/>
-    <cs:fontRef idx="minor">
-      <a:schemeClr val="dk1">
-        <a:lumMod val="65000"/>
-        <a:lumOff val="35000"/>
-      </a:schemeClr>
-    </cs:fontRef>
-    <cs:spPr>
-      <a:solidFill>
-        <a:schemeClr val="lt1"/>
-      </a:solidFill>
-      <a:ln>
-        <a:solidFill>
-          <a:schemeClr val="dk1">
-            <a:lumMod val="25000"/>
-            <a:lumOff val="75000"/>
-          </a:schemeClr>
-        </a:solidFill>
-      </a:ln>
-    </cs:spPr>
-    <cs:defRPr sz="1197" kern="1200"/>
-  </cs:dataLabelCallout>
-  <cs:dataPoint>
-    <cs:lnRef idx="0"/>
-    <cs:fillRef idx="1">
-      <cs:styleClr val="auto"/>
-    </cs:fillRef>
-    <cs:effectRef idx="0"/>
-    <cs:fontRef idx="minor">
-      <a:schemeClr val="tx1"/>
-    </cs:fontRef>
-  </cs:dataPoint>
-  <cs:dataPoint3D>
-    <cs:lnRef idx="0"/>
-    <cs:fillRef idx="1">
-      <cs:styleClr val="auto"/>
-    </cs:fillRef>
-    <cs:effectRef idx="0"/>
-    <cs:fontRef idx="minor">
-      <a:schemeClr val="tx1"/>
-    </cs:fontRef>
-  </cs:dataPoint3D>
-  <cs:dataPointLine>
-    <cs:lnRef idx="0">
-      <cs:styleClr val="auto"/>
-    </cs:lnRef>
-    <cs:fillRef idx="1"/>
-    <cs:effectRef idx="0"/>
-    <cs:fontRef idx="minor">
-      <a:schemeClr val="tx1"/>
-    </cs:fontRef>
-    <cs:spPr>
-      <a:ln w="28575" cap="rnd">
-        <a:solidFill>
-          <a:schemeClr val="phClr"/>
-        </a:solidFill>
-        <a:round/>
-      </a:ln>
-    </cs:spPr>
-  </cs:dataPointLine>
-  <cs:dataPointMarker>
-    <cs:lnRef idx="0">
-      <cs:styleClr val="auto"/>
-    </cs:lnRef>
-    <cs:fillRef idx="1">
-      <cs:styleClr val="auto"/>
-    </cs:fillRef>
-    <cs:effectRef idx="0"/>
-    <cs:fontRef idx="minor">
-      <a:schemeClr val="tx1"/>
-    </cs:fontRef>
-    <cs:spPr>
-      <a:ln w="9525">
-        <a:solidFill>
-          <a:schemeClr val="phClr"/>
-        </a:solidFill>
-      </a:ln>
-    </cs:spPr>
-  </cs:dataPointMarker>
-  <cs:dataPointMarkerLayout symbol="circle" size="5"/>
-  <cs:dataPointWireframe>
-    <cs:lnRef idx="0">
-      <cs:styleClr val="auto"/>
-    </cs:lnRef>
-    <cs:fillRef idx="1"/>
-    <cs:effectRef idx="0"/>
-    <cs:fontRef idx="minor">
-      <a:schemeClr val="tx1"/>
-    </cs:fontRef>
-    <cs:spPr>
-      <a:ln w="9525" cap="rnd">
-        <a:solidFill>
-          <a:schemeClr val="phClr"/>
-        </a:solidFill>
-        <a:round/>
-      </a:ln>
-    </cs:spPr>
-  </cs:dataPointWireframe>
-  <cs:dataTable>
-    <cs:lnRef idx="0"/>
-    <cs:fillRef idx="0"/>
-    <cs:effectRef idx="0"/>
-    <cs:fontRef idx="minor">
-      <a:schemeClr val="tx1">
-        <a:lumMod val="65000"/>
-        <a:lumOff val="35000"/>
-      </a:schemeClr>
-    </cs:fontRef>
-    <cs:spPr>
-      <a:noFill/>
-      <a:ln w="9525" cap="flat" cmpd="sng" algn="ctr">
-        <a:solidFill>
-          <a:schemeClr val="tx1">
-            <a:lumMod val="15000"/>
-            <a:lumOff val="85000"/>
-          </a:schemeClr>
-        </a:solidFill>
-        <a:round/>
-      </a:ln>
-    </cs:spPr>
-    <cs:defRPr sz="1197" kern="1200"/>
-  </cs:dataTable>
-  <cs:downBar>
-    <cs:lnRef idx="0"/>
-    <cs:fillRef idx="0"/>
-    <cs:effectRef idx="0"/>
-    <cs:fontRef idx="minor">
-      <a:schemeClr val="dk1"/>
-    </cs:fontRef>
-    <cs:spPr>
-      <a:solidFill>
-        <a:schemeClr val="dk1">
-          <a:lumMod val="65000"/>
-          <a:lumOff val="35000"/>
-        </a:schemeClr>
-      </a:solidFill>
-      <a:ln w="9525">
-        <a:solidFill>
-          <a:schemeClr val="tx1">
-            <a:lumMod val="65000"/>
-            <a:lumOff val="35000"/>
-          </a:schemeClr>
-        </a:solidFill>
-      </a:ln>
-    </cs:spPr>
-  </cs:downBar>
-  <cs:dropLine>
-    <cs:lnRef idx="0"/>
-    <cs:fillRef idx="0"/>
-    <cs:effectRef idx="0"/>
-    <cs:fontRef idx="minor">
-      <a:schemeClr val="tx1"/>
-    </cs:fontRef>
-    <cs:spPr>
-      <a:ln w="9525" cap="flat" cmpd="sng" algn="ctr">
-        <a:solidFill>
-          <a:schemeClr val="tx1">
-            <a:lumMod val="35000"/>
-            <a:lumOff val="65000"/>
-          </a:schemeClr>
-        </a:solidFill>
-        <a:round/>
-      </a:ln>
-    </cs:spPr>
-  </cs:dropLine>
-  <cs:errorBar>
-    <cs:lnRef idx="0"/>
-    <cs:fillRef idx="0"/>
-    <cs:effectRef idx="0"/>
-    <cs:fontRef idx="minor">
-      <a:schemeClr val="tx1"/>
-    </cs:fontRef>
-    <cs:spPr>
-      <a:ln w="9525" cap="flat" cmpd="sng" algn="ctr">
-        <a:solidFill>
-          <a:schemeClr val="tx1">
-            <a:lumMod val="65000"/>
-            <a:lumOff val="35000"/>
-          </a:schemeClr>
-        </a:solidFill>
-        <a:round/>
-      </a:ln>
-    </cs:spPr>
-  </cs:errorBar>
-  <cs:floor>
-    <cs:lnRef idx="0"/>
-    <cs:fillRef idx="0"/>
-    <cs:effectRef idx="0"/>
-    <cs:fontRef idx="minor">
-      <a:schemeClr val="tx1"/>
-    </cs:fontRef>
-    <cs:spPr>
-      <a:noFill/>
-      <a:ln>
-        <a:noFill/>
-      </a:ln>
-    </cs:spPr>
-  </cs:floor>
-  <cs:gridlineMajor>
-    <cs:lnRef idx="0"/>
-    <cs:fillRef idx="0"/>
-    <cs:effectRef idx="0"/>
-    <cs:fontRef idx="minor">
-      <a:schemeClr val="tx1"/>
-    </cs:fontRef>
-    <cs:spPr>
-      <a:ln w="9525" cap="flat" cmpd="sng" algn="ctr">
-        <a:solidFill>
-          <a:schemeClr val="tx1">
-            <a:lumMod val="15000"/>
-            <a:lumOff val="85000"/>
-          </a:schemeClr>
-        </a:solidFill>
-        <a:round/>
-      </a:ln>
-    </cs:spPr>
-  </cs:gridlineMajor>
-  <cs:gridlineMinor>
-    <cs:lnRef idx="0"/>
-    <cs:fillRef idx="0"/>
-    <cs:effectRef idx="0"/>
-    <cs:fontRef idx="minor">
-      <a:schemeClr val="tx1"/>
-    </cs:fontRef>
-    <cs:spPr>
-      <a:ln w="9525" cap="flat" cmpd="sng" algn="ctr">
-        <a:solidFill>
-          <a:schemeClr val="tx1">
-            <a:lumMod val="5000"/>
-            <a:lumOff val="95000"/>
-          </a:schemeClr>
-        </a:solidFill>
-        <a:round/>
-      </a:ln>
-    </cs:spPr>
-  </cs:gridlineMinor>
-  <cs:hiLoLine>
-    <cs:lnRef idx="0"/>
-    <cs:fillRef idx="0"/>
-    <cs:effectRef idx="0"/>
-    <cs:fontRef idx="minor">
-      <a:schemeClr val="tx1"/>
-    </cs:fontRef>
-    <cs:spPr>
-      <a:ln w="9525" cap="flat" cmpd="sng" algn="ctr">
-        <a:solidFill>
-          <a:schemeClr val="tx1">
-            <a:lumMod val="75000"/>
-            <a:lumOff val="25000"/>
-          </a:schemeClr>
-        </a:solidFill>
-        <a:round/>
-      </a:ln>
-    </cs:spPr>
-  </cs:hiLoLine>
-  <cs:leaderLine>
-    <cs:lnRef idx="0"/>
-    <cs:fillRef idx="0"/>
-    <cs:effectRef idx="0"/>
-    <cs:fontRef idx="minor">
-      <a:schemeClr val="tx1"/>
-    </cs:fontRef>
-    <cs:spPr>
-      <a:ln w="9525" cap="flat" cmpd="sng" algn="ctr">
-        <a:solidFill>
-          <a:schemeClr val="tx1">
-            <a:lumMod val="35000"/>
-            <a:lumOff val="65000"/>
-          </a:schemeClr>
-        </a:solidFill>
-        <a:round/>
-      </a:ln>
-    </cs:spPr>
-  </cs:leaderLine>
-  <cs:legend>
-    <cs:lnRef idx="0"/>
-    <cs:fillRef idx="0"/>
-    <cs:effectRef idx="0"/>
-    <cs:fontRef idx="minor">
-      <a:schemeClr val="tx1">
-        <a:lumMod val="65000"/>
-        <a:lumOff val="35000"/>
-      </a:schemeClr>
-    </cs:fontRef>
-    <cs:defRPr sz="1197" kern="1200"/>
-  </cs:legend>
-  <cs:plotArea mods="allowNoFillOverride allowNoLineOverride">
-    <cs:lnRef idx="0"/>
-    <cs:fillRef idx="0"/>
-    <cs:effectRef idx="0"/>
-    <cs:fontRef idx="minor">
-      <a:schemeClr val="tx1"/>
-    </cs:fontRef>
-  </cs:plotArea>
-  <cs:plotArea3D mods="allowNoFillOverride allowNoLineOverride">
-    <cs:lnRef idx="0"/>
-    <cs:fillRef idx="0"/>
-    <cs:effectRef idx="0"/>
-    <cs:fontRef idx="minor">
-      <a:schemeClr val="tx1"/>
-    </cs:fontRef>
-  </cs:plotArea3D>
-  <cs:seriesAxis>
-    <cs:lnRef idx="0"/>
-    <cs:fillRef idx="0"/>
-    <cs:effectRef idx="0"/>
-    <cs:fontRef idx="minor">
-      <a:schemeClr val="tx1">
-        <a:lumMod val="65000"/>
-        <a:lumOff val="35000"/>
-      </a:schemeClr>
-    </cs:fontRef>
-    <cs:defRPr sz="1197" kern="1200"/>
-  </cs:seriesAxis>
-  <cs:seriesLine>
-    <cs:lnRef idx="0"/>
-    <cs:fillRef idx="0"/>
-    <cs:effectRef idx="0"/>
-    <cs:fontRef idx="minor">
-      <a:schemeClr val="tx1"/>
-    </cs:fontRef>
-    <cs:spPr>
-      <a:ln w="9525" cap="flat" cmpd="sng" algn="ctr">
-        <a:solidFill>
-          <a:schemeClr val="tx1">
-            <a:lumMod val="35000"/>
-            <a:lumOff val="65000"/>
-          </a:schemeClr>
-        </a:solidFill>
-        <a:round/>
-      </a:ln>
-    </cs:spPr>
-  </cs:seriesLine>
-  <cs:title>
-    <cs:lnRef idx="0"/>
-    <cs:fillRef idx="0"/>
-    <cs:effectRef idx="0"/>
-    <cs:fontRef idx="minor">
-      <a:schemeClr val="tx1">
-        <a:lumMod val="65000"/>
-        <a:lumOff val="35000"/>
-      </a:schemeClr>
-    </cs:fontRef>
-    <cs:defRPr sz="1862" b="0" kern="1200" spc="0" baseline="0"/>
-  </cs:title>
-  <cs:trendline>
-    <cs:lnRef idx="0">
-      <cs:styleClr val="auto"/>
-    </cs:lnRef>
-    <cs:fillRef idx="0"/>
-    <cs:effectRef idx="0"/>
-    <cs:fontRef idx="minor">
-      <a:schemeClr val="tx1"/>
-    </cs:fontRef>
-    <cs:spPr>
-      <a:ln w="19050" cap="rnd">
-        <a:solidFill>
-          <a:schemeClr val="phClr"/>
-        </a:solidFill>
-        <a:prstDash val="sysDot"/>
-      </a:ln>
-    </cs:spPr>
-  </cs:trendline>
-  <cs:trendlineLabel>
-    <cs:lnRef idx="0"/>
-    <cs:fillRef idx="0"/>
-    <cs:effectRef idx="0"/>
-    <cs:fontRef idx="minor">
-      <a:schemeClr val="tx1">
-        <a:lumMod val="65000"/>
-        <a:lumOff val="35000"/>
-      </a:schemeClr>
-    </cs:fontRef>
-    <cs:defRPr sz="1197" kern="1200"/>
-  </cs:trendlineLabel>
-  <cs:upBar>
-    <cs:lnRef idx="0"/>
-    <cs:fillRef idx="0"/>
-    <cs:effectRef idx="0"/>
-    <cs:fontRef idx="minor">
-      <a:schemeClr val="dk1"/>
-    </cs:fontRef>
-    <cs:spPr>
-      <a:solidFill>
-        <a:schemeClr val="lt1"/>
-      </a:solidFill>
-      <a:ln w="9525">
-        <a:solidFill>
-          <a:schemeClr val="tx1">
-            <a:lumMod val="15000"/>
-            <a:lumOff val="85000"/>
-          </a:schemeClr>
-        </a:solidFill>
-      </a:ln>
-    </cs:spPr>
-  </cs:upBar>
-  <cs:valueAxis>
-    <cs:lnRef idx="0"/>
-    <cs:fillRef idx="0"/>
-    <cs:effectRef idx="0"/>
-    <cs:fontRef idx="minor">
-      <a:schemeClr val="tx1">
-        <a:lumMod val="65000"/>
-        <a:lumOff val="35000"/>
-      </a:schemeClr>
-    </cs:fontRef>
-    <cs:defRPr sz="1197" kern="1200"/>
-  </cs:valueAxis>
-  <cs:wall>
-    <cs:lnRef idx="0"/>
-    <cs:fillRef idx="0"/>
-    <cs:effectRef idx="0"/>
-    <cs:fontRef idx="minor">
-      <a:schemeClr val="tx1"/>
-    </cs:fontRef>
-    <cs:spPr>
-      <a:noFill/>
-      <a:ln>
-        <a:noFill/>
-      </a:ln>
-    </cs:spPr>
   </cs:wall>
 </cs:chartStyle>
 </file>
@@ -2005,7 +2144,7 @@
           <a:p>
             <a:fld id="{D9F912AB-2776-42F2-A957-313FC7EFEDB9}" type="slidenum">
               <a:rPr lang="pt-PT" smtClean="0"/>
-              <a:t>‹#›</a:t>
+              <a:t>‹nº›</a:t>
             </a:fld>
             <a:endParaRPr lang="pt-PT" dirty="0"/>
           </a:p>
@@ -2263,7 +2402,7 @@
           <a:p>
             <a:fld id="{F93199CD-3E1B-4AE6-990F-76F925F5EA9F}" type="slidenum">
               <a:rPr lang="pt-PT" smtClean="0"/>
-              <a:t>‹#›</a:t>
+              <a:t>‹nº›</a:t>
             </a:fld>
             <a:endParaRPr lang="pt-PT" dirty="0"/>
           </a:p>
@@ -2749,7 +2888,7 @@
           <a:p>
             <a:fld id="{2A013F82-EE5E-44EE-A61D-E31C6657F26F}" type="slidenum">
               <a:rPr lang="pt-PT" smtClean="0"/>
-              <a:t>‹#›</a:t>
+              <a:t>‹nº›</a:t>
             </a:fld>
             <a:endParaRPr lang="pt-PT" dirty="0"/>
           </a:p>
@@ -2948,7 +3087,7 @@
           <a:p>
             <a:fld id="{2A013F82-EE5E-44EE-A61D-E31C6657F26F}" type="slidenum">
               <a:rPr lang="pt-PT" smtClean="0"/>
-              <a:t>‹#›</a:t>
+              <a:t>‹nº›</a:t>
             </a:fld>
             <a:endParaRPr lang="pt-PT" dirty="0"/>
           </a:p>
@@ -3144,7 +3283,7 @@
           <a:p>
             <a:fld id="{2A013F82-EE5E-44EE-A61D-E31C6657F26F}" type="slidenum">
               <a:rPr lang="pt-PT" smtClean="0"/>
-              <a:t>‹#›</a:t>
+              <a:t>‹nº›</a:t>
             </a:fld>
             <a:endParaRPr lang="pt-PT" dirty="0"/>
           </a:p>
@@ -3431,7 +3570,7 @@
           <a:p>
             <a:fld id="{2A013F82-EE5E-44EE-A61D-E31C6657F26F}" type="slidenum">
               <a:rPr lang="pt-PT" smtClean="0"/>
-              <a:t>‹#›</a:t>
+              <a:t>‹nº›</a:t>
             </a:fld>
             <a:endParaRPr lang="pt-PT" dirty="0"/>
           </a:p>
@@ -3747,7 +3886,7 @@
           <a:p>
             <a:fld id="{2A013F82-EE5E-44EE-A61D-E31C6657F26F}" type="slidenum">
               <a:rPr lang="pt-PT" smtClean="0"/>
-              <a:t>‹#›</a:t>
+              <a:t>‹nº›</a:t>
             </a:fld>
             <a:endParaRPr lang="pt-PT" dirty="0"/>
           </a:p>
@@ -4215,7 +4354,7 @@
           <a:p>
             <a:fld id="{2A013F82-EE5E-44EE-A61D-E31C6657F26F}" type="slidenum">
               <a:rPr lang="pt-PT" smtClean="0"/>
-              <a:t>‹#›</a:t>
+              <a:t>‹nº›</a:t>
             </a:fld>
             <a:endParaRPr lang="pt-PT" dirty="0"/>
           </a:p>
@@ -4352,7 +4491,7 @@
           <a:p>
             <a:fld id="{2A013F82-EE5E-44EE-A61D-E31C6657F26F}" type="slidenum">
               <a:rPr lang="pt-PT" smtClean="0"/>
-              <a:t>‹#›</a:t>
+              <a:t>‹nº›</a:t>
             </a:fld>
             <a:endParaRPr lang="pt-PT" dirty="0"/>
           </a:p>
@@ -4474,7 +4613,7 @@
           <a:p>
             <a:fld id="{2A013F82-EE5E-44EE-A61D-E31C6657F26F}" type="slidenum">
               <a:rPr lang="pt-PT" smtClean="0"/>
-              <a:t>‹#›</a:t>
+              <a:t>‹nº›</a:t>
             </a:fld>
             <a:endParaRPr lang="pt-PT" dirty="0"/>
           </a:p>
@@ -4803,7 +4942,7 @@
           <a:p>
             <a:fld id="{2A013F82-EE5E-44EE-A61D-E31C6657F26F}" type="slidenum">
               <a:rPr lang="pt-PT" smtClean="0"/>
-              <a:t>‹#›</a:t>
+              <a:t>‹nº›</a:t>
             </a:fld>
             <a:endParaRPr lang="pt-PT" dirty="0"/>
           </a:p>
@@ -5123,7 +5262,7 @@
             <a:fld id="{2A013F82-EE5E-44EE-A61D-E31C6657F26F}" type="slidenum">
               <a:rPr lang="pt-PT" smtClean="0"/>
               <a:pPr/>
-              <a:t>‹#›</a:t>
+              <a:t>‹nº›</a:t>
             </a:fld>
             <a:endParaRPr lang="pt-PT" dirty="0"/>
           </a:p>
@@ -5402,7 +5541,7 @@
             <a:fld id="{2A013F82-EE5E-44EE-A61D-E31C6657F26F}" type="slidenum">
               <a:rPr lang="pt-PT" smtClean="0"/>
               <a:pPr/>
-              <a:t>‹#›</a:t>
+              <a:t>‹nº›</a:t>
             </a:fld>
             <a:endParaRPr lang="pt-PT" dirty="0"/>
           </a:p>
@@ -6242,18 +6381,34 @@
           <a:p>
             <a:pPr algn="ctr"/>
             <a:r>
-              <a:rPr lang="pt-PT" dirty="0" err="1" smtClean="0"/>
+              <a:rPr lang="pt-PT" dirty="0" err="1" smtClean="0">
+                <a:solidFill>
+                  <a:schemeClr val="bg1"/>
+                </a:solidFill>
+              </a:rPr>
               <a:t>Requirements</a:t>
             </a:r>
             <a:r>
-              <a:rPr lang="pt-PT" dirty="0" smtClean="0"/>
+              <a:rPr lang="pt-PT" dirty="0" smtClean="0">
+                <a:solidFill>
+                  <a:schemeClr val="bg1"/>
+                </a:solidFill>
+              </a:rPr>
               <a:t> </a:t>
             </a:r>
             <a:r>
-              <a:rPr lang="pt-PT" dirty="0" err="1" smtClean="0"/>
+              <a:rPr lang="pt-PT" dirty="0" err="1" smtClean="0">
+                <a:solidFill>
+                  <a:schemeClr val="bg1"/>
+                </a:solidFill>
+              </a:rPr>
               <a:t>Analysis</a:t>
             </a:r>
-            <a:endParaRPr lang="pt-PT" dirty="0"/>
+            <a:endParaRPr lang="pt-PT" dirty="0">
+              <a:solidFill>
+                <a:schemeClr val="bg1"/>
+              </a:solidFill>
+            </a:endParaRPr>
           </a:p>
         </p:txBody>
       </p:sp>
@@ -6294,14 +6449,26 @@
           <a:p>
             <a:pPr algn="ctr"/>
             <a:r>
-              <a:rPr lang="pt-PT" dirty="0" smtClean="0"/>
+              <a:rPr lang="pt-PT" dirty="0" smtClean="0">
+                <a:solidFill>
+                  <a:schemeClr val="bg1"/>
+                </a:solidFill>
+              </a:rPr>
               <a:t>Design &amp; </a:t>
             </a:r>
             <a:r>
-              <a:rPr lang="pt-PT" dirty="0" err="1" smtClean="0"/>
+              <a:rPr lang="pt-PT" dirty="0" err="1" smtClean="0">
+                <a:solidFill>
+                  <a:schemeClr val="bg1"/>
+                </a:solidFill>
+              </a:rPr>
               <a:t>Construction</a:t>
             </a:r>
-            <a:endParaRPr lang="pt-PT" dirty="0"/>
+            <a:endParaRPr lang="pt-PT" dirty="0">
+              <a:solidFill>
+                <a:schemeClr val="bg1"/>
+              </a:solidFill>
+            </a:endParaRPr>
           </a:p>
         </p:txBody>
       </p:sp>
@@ -6342,18 +6509,34 @@
           <a:p>
             <a:pPr algn="ctr"/>
             <a:r>
-              <a:rPr lang="pt-PT" dirty="0" err="1" smtClean="0"/>
+              <a:rPr lang="pt-PT" dirty="0" err="1" smtClean="0">
+                <a:solidFill>
+                  <a:schemeClr val="bg1"/>
+                </a:solidFill>
+              </a:rPr>
               <a:t>Verification</a:t>
             </a:r>
             <a:r>
-              <a:rPr lang="pt-PT" dirty="0" smtClean="0"/>
+              <a:rPr lang="pt-PT" dirty="0" smtClean="0">
+                <a:solidFill>
+                  <a:schemeClr val="bg1"/>
+                </a:solidFill>
+              </a:rPr>
               <a:t> &amp; </a:t>
             </a:r>
             <a:r>
-              <a:rPr lang="pt-PT" dirty="0" err="1" smtClean="0"/>
+              <a:rPr lang="pt-PT" dirty="0" err="1" smtClean="0">
+                <a:solidFill>
+                  <a:schemeClr val="bg1"/>
+                </a:solidFill>
+              </a:rPr>
               <a:t>Validation</a:t>
             </a:r>
-            <a:endParaRPr lang="pt-PT" dirty="0"/>
+            <a:endParaRPr lang="pt-PT" dirty="0">
+              <a:solidFill>
+                <a:schemeClr val="bg1"/>
+              </a:solidFill>
+            </a:endParaRPr>
           </a:p>
         </p:txBody>
       </p:sp>
@@ -6624,7 +6807,7 @@
             <p:ph idx="1"/>
             <p:extLst>
               <p:ext uri="{D42A27DB-BD31-4B8C-83A1-F6EECF244321}">
-                <p14:modId xmlns:p14="http://schemas.microsoft.com/office/powerpoint/2010/main" val="2150061333"/>
+                <p14:modId xmlns:p14="http://schemas.microsoft.com/office/powerpoint/2010/main" val="2865681912"/>
               </p:ext>
             </p:extLst>
           </p:nvPr>
@@ -6952,7 +7135,7 @@
             <p:ph idx="1"/>
             <p:extLst>
               <p:ext uri="{D42A27DB-BD31-4B8C-83A1-F6EECF244321}">
-                <p14:modId xmlns:p14="http://schemas.microsoft.com/office/powerpoint/2010/main" val="976532531"/>
+                <p14:modId xmlns:p14="http://schemas.microsoft.com/office/powerpoint/2010/main" val="3618833694"/>
               </p:ext>
             </p:extLst>
           </p:nvPr>
@@ -8453,6 +8636,20 @@
           <a:bodyPr/>
           <a:lstStyle/>
           <a:p>
+            <a:r>
+              <a:rPr lang="pt-PT" dirty="0" smtClean="0"/>
+              <a:t>Team </a:t>
+            </a:r>
+            <a:r>
+              <a:rPr lang="pt-PT" dirty="0" err="1" smtClean="0"/>
+              <a:t>name</a:t>
+            </a:r>
+            <a:r>
+              <a:rPr lang="pt-PT" dirty="0" smtClean="0"/>
+              <a:t> : Ps2win</a:t>
+            </a:r>
+          </a:p>
+          <a:p>
             <a:endParaRPr lang="pt-PT" dirty="0"/>
           </a:p>
         </p:txBody>
@@ -8523,7 +8720,11 @@
           <a:p>
             <a:r>
               <a:rPr lang="pt-PT" dirty="0" smtClean="0"/>
-              <a:t>Team</a:t>
+              <a:t>Team </a:t>
+            </a:r>
+            <a:r>
+              <a:rPr lang="pt-PT" dirty="0" err="1" smtClean="0"/>
+              <a:t>Members</a:t>
             </a:r>
             <a:endParaRPr lang="pt-PT" dirty="0"/>
           </a:p>
@@ -8696,8 +8897,13 @@
             </a:r>
             <a:r>
               <a:rPr lang="pt-PT" dirty="0"/>
-              <a:t> Manager:</a:t>
-            </a:r>
+              <a:t> </a:t>
+            </a:r>
+            <a:r>
+              <a:rPr lang="pt-PT" dirty="0" smtClean="0"/>
+              <a:t>Manager</a:t>
+            </a:r>
+            <a:endParaRPr lang="pt-PT" dirty="0"/>
           </a:p>
           <a:p>
             <a:r>

</xml_diff>